<commit_message>
base formulario registro, cambio en wireframe
</commit_message>
<xml_diff>
--- a/Docs/wireframe cat-attack.pptx
+++ b/Docs/wireframe cat-attack.pptx
@@ -1788,7 +1788,7 @@
           <a:p>
             <a:fld id="{8F72BA41-EC5B-4197-BCC8-0FD2E523CD7A}" type="datetimeFigureOut">
               <a:rPr lang="en-US" smtClean="0"/>
-              <a:t>10/26/2021</a:t>
+              <a:t>11/8/2021</a:t>
             </a:fld>
             <a:endParaRPr lang="en-US"/>
           </a:p>
@@ -1991,7 +1991,7 @@
           <a:p>
             <a:fld id="{8F72BA41-EC5B-4197-BCC8-0FD2E523CD7A}" type="datetimeFigureOut">
               <a:rPr lang="en-US" smtClean="0"/>
-              <a:t>10/26/2021</a:t>
+              <a:t>11/8/2021</a:t>
             </a:fld>
             <a:endParaRPr lang="en-US"/>
           </a:p>
@@ -3712,7 +3712,7 @@
           <a:p>
             <a:fld id="{8F72BA41-EC5B-4197-BCC8-0FD2E523CD7A}" type="datetimeFigureOut">
               <a:rPr lang="en-US" smtClean="0"/>
-              <a:t>10/26/2021</a:t>
+              <a:t>11/8/2021</a:t>
             </a:fld>
             <a:endParaRPr lang="en-US"/>
           </a:p>
@@ -3911,7 +3911,7 @@
           <a:p>
             <a:fld id="{8F72BA41-EC5B-4197-BCC8-0FD2E523CD7A}" type="datetimeFigureOut">
               <a:rPr lang="en-US" smtClean="0"/>
-              <a:t>10/26/2021</a:t>
+              <a:t>11/8/2021</a:t>
             </a:fld>
             <a:endParaRPr lang="en-US"/>
           </a:p>
@@ -5701,7 +5701,7 @@
           <a:p>
             <a:fld id="{8F72BA41-EC5B-4197-BCC8-0FD2E523CD7A}" type="datetimeFigureOut">
               <a:rPr lang="en-US" smtClean="0"/>
-              <a:t>10/26/2021</a:t>
+              <a:t>11/8/2021</a:t>
             </a:fld>
             <a:endParaRPr lang="en-US"/>
           </a:p>
@@ -5974,7 +5974,7 @@
           <a:p>
             <a:fld id="{8F72BA41-EC5B-4197-BCC8-0FD2E523CD7A}" type="datetimeFigureOut">
               <a:rPr lang="en-US" smtClean="0"/>
-              <a:t>10/26/2021</a:t>
+              <a:t>11/8/2021</a:t>
             </a:fld>
             <a:endParaRPr lang="en-US"/>
           </a:p>
@@ -6394,7 +6394,7 @@
           <a:p>
             <a:fld id="{8F72BA41-EC5B-4197-BCC8-0FD2E523CD7A}" type="datetimeFigureOut">
               <a:rPr lang="en-US" smtClean="0"/>
-              <a:t>10/26/2021</a:t>
+              <a:t>11/8/2021</a:t>
             </a:fld>
             <a:endParaRPr lang="en-US"/>
           </a:p>
@@ -6550,7 +6550,7 @@
           <a:p>
             <a:fld id="{8F72BA41-EC5B-4197-BCC8-0FD2E523CD7A}" type="datetimeFigureOut">
               <a:rPr lang="en-US" smtClean="0"/>
-              <a:t>10/26/2021</a:t>
+              <a:t>11/8/2021</a:t>
             </a:fld>
             <a:endParaRPr lang="en-US"/>
           </a:p>
@@ -8118,7 +8118,7 @@
           <a:p>
             <a:fld id="{8F72BA41-EC5B-4197-BCC8-0FD2E523CD7A}" type="datetimeFigureOut">
               <a:rPr lang="en-US" smtClean="0"/>
-              <a:t>10/26/2021</a:t>
+              <a:t>11/8/2021</a:t>
             </a:fld>
             <a:endParaRPr lang="en-US"/>
           </a:p>
@@ -9969,7 +9969,7 @@
           <a:p>
             <a:fld id="{8F72BA41-EC5B-4197-BCC8-0FD2E523CD7A}" type="datetimeFigureOut">
               <a:rPr lang="en-US" smtClean="0"/>
-              <a:t>10/26/2021</a:t>
+              <a:t>11/8/2021</a:t>
             </a:fld>
             <a:endParaRPr lang="en-US"/>
           </a:p>
@@ -11782,7 +11782,7 @@
           <a:p>
             <a:fld id="{8F72BA41-EC5B-4197-BCC8-0FD2E523CD7A}" type="datetimeFigureOut">
               <a:rPr lang="en-US" smtClean="0"/>
-              <a:t>10/26/2021</a:t>
+              <a:t>11/8/2021</a:t>
             </a:fld>
             <a:endParaRPr lang="en-US"/>
           </a:p>
@@ -13476,7 +13476,7 @@
             <a:fld id="{8F72BA41-EC5B-4197-BCC8-0FD2E523CD7A}" type="datetimeFigureOut">
               <a:rPr lang="en-US" smtClean="0"/>
               <a:pPr/>
-              <a:t>10/26/2021</a:t>
+              <a:t>11/8/2021</a:t>
             </a:fld>
             <a:endParaRPr lang="en-US" dirty="0"/>
           </a:p>
@@ -16543,8 +16543,8 @@
         </p:nvSpPr>
         <p:spPr>
           <a:xfrm>
-            <a:off x="337350" y="1359762"/>
-            <a:ext cx="11505461" cy="2996578"/>
+            <a:off x="337350" y="1359761"/>
+            <a:ext cx="11505461" cy="4054449"/>
           </a:xfrm>
           <a:prstGeom prst="rect">
             <a:avLst/>
@@ -17418,6 +17418,298 @@
                 </a:effectLst>
               </a:rPr>
               <a:t>nacimiento</a:t>
+            </a:r>
+            <a:r>
+              <a:rPr lang="en-US" sz="2000" dirty="0">
+                <a:ln w="0"/>
+                <a:effectLst>
+                  <a:outerShdw blurRad="38100" dist="19050" dir="2700000" algn="tl" rotWithShape="0">
+                    <a:schemeClr val="dk1">
+                      <a:alpha val="40000"/>
+                    </a:schemeClr>
+                  </a:outerShdw>
+                </a:effectLst>
+              </a:rPr>
+              <a:t>:</a:t>
+            </a:r>
+            <a:endParaRPr lang="en-US" sz="2000" b="0" cap="none" spc="0" dirty="0">
+              <a:ln w="0"/>
+              <a:solidFill>
+                <a:schemeClr val="tx1"/>
+              </a:solidFill>
+              <a:effectLst>
+                <a:outerShdw blurRad="38100" dist="19050" dir="2700000" algn="tl" rotWithShape="0">
+                  <a:schemeClr val="dk1">
+                    <a:alpha val="40000"/>
+                  </a:schemeClr>
+                </a:outerShdw>
+              </a:effectLst>
+            </a:endParaRPr>
+          </a:p>
+        </p:txBody>
+      </p:sp>
+      <p:sp>
+        <p:nvSpPr>
+          <p:cNvPr id="21" name="Rectangle 7">
+            <a:extLst>
+              <a:ext uri="{FF2B5EF4-FFF2-40B4-BE49-F238E27FC236}">
+                <a16:creationId xmlns:a16="http://schemas.microsoft.com/office/drawing/2014/main" id="{C90C603C-A7FB-40E7-A0C1-B6B099ED3B8B}"/>
+              </a:ext>
+            </a:extLst>
+          </p:cNvPr>
+          <p:cNvSpPr/>
+          <p:nvPr/>
+        </p:nvSpPr>
+        <p:spPr>
+          <a:xfrm>
+            <a:off x="3726420" y="4223928"/>
+            <a:ext cx="2706110" cy="400110"/>
+          </a:xfrm>
+          <a:prstGeom prst="rect">
+            <a:avLst/>
+          </a:prstGeom>
+          <a:noFill/>
+        </p:spPr>
+        <p:txBody>
+          <a:bodyPr wrap="square" lIns="91440" tIns="45720" rIns="91440" bIns="45720">
+            <a:spAutoFit/>
+          </a:bodyPr>
+          <a:lstStyle/>
+          <a:p>
+            <a:pPr algn="ctr"/>
+            <a:r>
+              <a:rPr lang="en-US" sz="2000" b="0" cap="none" spc="0" dirty="0" err="1">
+                <a:ln w="0"/>
+                <a:solidFill>
+                  <a:schemeClr val="tx1"/>
+                </a:solidFill>
+                <a:effectLst>
+                  <a:outerShdw blurRad="38100" dist="19050" dir="2700000" algn="tl" rotWithShape="0">
+                    <a:schemeClr val="dk1">
+                      <a:alpha val="40000"/>
+                    </a:schemeClr>
+                  </a:outerShdw>
+                </a:effectLst>
+              </a:rPr>
+              <a:t>Contraseña</a:t>
+            </a:r>
+            <a:r>
+              <a:rPr lang="en-US" sz="2000" dirty="0">
+                <a:ln w="0"/>
+                <a:effectLst>
+                  <a:outerShdw blurRad="38100" dist="19050" dir="2700000" algn="tl" rotWithShape="0">
+                    <a:schemeClr val="dk1">
+                      <a:alpha val="40000"/>
+                    </a:schemeClr>
+                  </a:outerShdw>
+                </a:effectLst>
+              </a:rPr>
+              <a:t>:</a:t>
+            </a:r>
+            <a:endParaRPr lang="en-US" sz="2000" b="0" cap="none" spc="0" dirty="0">
+              <a:ln w="0"/>
+              <a:solidFill>
+                <a:schemeClr val="tx1"/>
+              </a:solidFill>
+              <a:effectLst>
+                <a:outerShdw blurRad="38100" dist="19050" dir="2700000" algn="tl" rotWithShape="0">
+                  <a:schemeClr val="dk1">
+                    <a:alpha val="40000"/>
+                  </a:schemeClr>
+                </a:outerShdw>
+              </a:effectLst>
+            </a:endParaRPr>
+          </a:p>
+        </p:txBody>
+      </p:sp>
+      <p:sp>
+        <p:nvSpPr>
+          <p:cNvPr id="22" name="Rectangle: Rounded Corners 7">
+            <a:extLst>
+              <a:ext uri="{FF2B5EF4-FFF2-40B4-BE49-F238E27FC236}">
+                <a16:creationId xmlns:a16="http://schemas.microsoft.com/office/drawing/2014/main" id="{99269CDB-D89C-47A9-A89B-F0F801DC7CA7}"/>
+              </a:ext>
+            </a:extLst>
+          </p:cNvPr>
+          <p:cNvSpPr/>
+          <p:nvPr/>
+        </p:nvSpPr>
+        <p:spPr>
+          <a:xfrm>
+            <a:off x="6675185" y="4200010"/>
+            <a:ext cx="4562186" cy="400111"/>
+          </a:xfrm>
+          <a:prstGeom prst="roundRect">
+            <a:avLst/>
+          </a:prstGeom>
+          <a:solidFill>
+            <a:schemeClr val="bg1"/>
+          </a:solidFill>
+          <a:ln>
+            <a:noFill/>
+          </a:ln>
+        </p:spPr>
+        <p:style>
+          <a:lnRef idx="2">
+            <a:schemeClr val="accent1">
+              <a:shade val="50000"/>
+            </a:schemeClr>
+          </a:lnRef>
+          <a:fillRef idx="1">
+            <a:schemeClr val="accent1"/>
+          </a:fillRef>
+          <a:effectRef idx="0">
+            <a:schemeClr val="accent1"/>
+          </a:effectRef>
+          <a:fontRef idx="minor">
+            <a:schemeClr val="lt1"/>
+          </a:fontRef>
+        </p:style>
+        <p:txBody>
+          <a:bodyPr rtlCol="0" anchor="ctr"/>
+          <a:lstStyle/>
+          <a:p>
+            <a:pPr algn="ctr"/>
+            <a:endParaRPr lang="en-US" sz="2000" dirty="0">
+              <a:solidFill>
+                <a:schemeClr val="bg1"/>
+              </a:solidFill>
+            </a:endParaRPr>
+          </a:p>
+        </p:txBody>
+      </p:sp>
+      <p:sp>
+        <p:nvSpPr>
+          <p:cNvPr id="24" name="Rectangle: Rounded Corners 7">
+            <a:extLst>
+              <a:ext uri="{FF2B5EF4-FFF2-40B4-BE49-F238E27FC236}">
+                <a16:creationId xmlns:a16="http://schemas.microsoft.com/office/drawing/2014/main" id="{283B7F6B-0804-43AE-845F-1609AEE9B08B}"/>
+              </a:ext>
+            </a:extLst>
+          </p:cNvPr>
+          <p:cNvSpPr/>
+          <p:nvPr/>
+        </p:nvSpPr>
+        <p:spPr>
+          <a:xfrm>
+            <a:off x="6675185" y="4726779"/>
+            <a:ext cx="4562186" cy="400111"/>
+          </a:xfrm>
+          <a:prstGeom prst="roundRect">
+            <a:avLst/>
+          </a:prstGeom>
+          <a:solidFill>
+            <a:schemeClr val="bg1"/>
+          </a:solidFill>
+          <a:ln>
+            <a:noFill/>
+          </a:ln>
+        </p:spPr>
+        <p:style>
+          <a:lnRef idx="2">
+            <a:schemeClr val="accent1">
+              <a:shade val="50000"/>
+            </a:schemeClr>
+          </a:lnRef>
+          <a:fillRef idx="1">
+            <a:schemeClr val="accent1"/>
+          </a:fillRef>
+          <a:effectRef idx="0">
+            <a:schemeClr val="accent1"/>
+          </a:effectRef>
+          <a:fontRef idx="minor">
+            <a:schemeClr val="lt1"/>
+          </a:fontRef>
+        </p:style>
+        <p:txBody>
+          <a:bodyPr rtlCol="0" anchor="ctr"/>
+          <a:lstStyle/>
+          <a:p>
+            <a:pPr algn="ctr"/>
+            <a:endParaRPr lang="en-US" sz="2000" dirty="0">
+              <a:solidFill>
+                <a:schemeClr val="bg1"/>
+              </a:solidFill>
+            </a:endParaRPr>
+          </a:p>
+        </p:txBody>
+      </p:sp>
+      <p:sp>
+        <p:nvSpPr>
+          <p:cNvPr id="26" name="Rectangle 7">
+            <a:extLst>
+              <a:ext uri="{FF2B5EF4-FFF2-40B4-BE49-F238E27FC236}">
+                <a16:creationId xmlns:a16="http://schemas.microsoft.com/office/drawing/2014/main" id="{A337575F-848B-461C-B6BD-E47D4E7368E4}"/>
+              </a:ext>
+            </a:extLst>
+          </p:cNvPr>
+          <p:cNvSpPr/>
+          <p:nvPr/>
+        </p:nvSpPr>
+        <p:spPr>
+          <a:xfrm>
+            <a:off x="3505424" y="4729159"/>
+            <a:ext cx="3148102" cy="400110"/>
+          </a:xfrm>
+          <a:prstGeom prst="rect">
+            <a:avLst/>
+          </a:prstGeom>
+          <a:noFill/>
+        </p:spPr>
+        <p:txBody>
+          <a:bodyPr wrap="square" lIns="91440" tIns="45720" rIns="91440" bIns="45720">
+            <a:spAutoFit/>
+          </a:bodyPr>
+          <a:lstStyle/>
+          <a:p>
+            <a:pPr algn="ctr"/>
+            <a:r>
+              <a:rPr lang="en-US" sz="2000" b="0" cap="none" spc="0" dirty="0" err="1">
+                <a:ln w="0"/>
+                <a:solidFill>
+                  <a:schemeClr val="tx1"/>
+                </a:solidFill>
+                <a:effectLst>
+                  <a:outerShdw blurRad="38100" dist="19050" dir="2700000" algn="tl" rotWithShape="0">
+                    <a:schemeClr val="dk1">
+                      <a:alpha val="40000"/>
+                    </a:schemeClr>
+                  </a:outerShdw>
+                </a:effectLst>
+              </a:rPr>
+              <a:t>Confirmar</a:t>
+            </a:r>
+            <a:r>
+              <a:rPr lang="en-US" sz="2000" b="0" cap="none" spc="0" dirty="0">
+                <a:ln w="0"/>
+                <a:solidFill>
+                  <a:schemeClr val="tx1"/>
+                </a:solidFill>
+                <a:effectLst>
+                  <a:outerShdw blurRad="38100" dist="19050" dir="2700000" algn="tl" rotWithShape="0">
+                    <a:schemeClr val="dk1">
+                      <a:alpha val="40000"/>
+                    </a:schemeClr>
+                  </a:outerShdw>
+                </a:effectLst>
+              </a:rPr>
+              <a:t> </a:t>
+            </a:r>
+            <a:r>
+              <a:rPr lang="en-US" sz="2000" b="0" cap="none" spc="0" dirty="0" err="1">
+                <a:ln w="0"/>
+                <a:solidFill>
+                  <a:schemeClr val="tx1"/>
+                </a:solidFill>
+                <a:effectLst>
+                  <a:outerShdw blurRad="38100" dist="19050" dir="2700000" algn="tl" rotWithShape="0">
+                    <a:schemeClr val="dk1">
+                      <a:alpha val="40000"/>
+                    </a:schemeClr>
+                  </a:outerShdw>
+                </a:effectLst>
+              </a:rPr>
+              <a:t>contraseña</a:t>
             </a:r>
             <a:r>
               <a:rPr lang="en-US" sz="2000" dirty="0">

</xml_diff>

<commit_message>
cambios en wireframe y pantalla de login
</commit_message>
<xml_diff>
--- a/Docs/wireframe cat-attack.pptx
+++ b/Docs/wireframe cat-attack.pptx
@@ -1788,7 +1788,7 @@
           <a:p>
             <a:fld id="{8F72BA41-EC5B-4197-BCC8-0FD2E523CD7A}" type="datetimeFigureOut">
               <a:rPr lang="en-US" smtClean="0"/>
-              <a:t>11/8/2021</a:t>
+              <a:t>11/30/2021</a:t>
             </a:fld>
             <a:endParaRPr lang="en-US"/>
           </a:p>
@@ -1991,7 +1991,7 @@
           <a:p>
             <a:fld id="{8F72BA41-EC5B-4197-BCC8-0FD2E523CD7A}" type="datetimeFigureOut">
               <a:rPr lang="en-US" smtClean="0"/>
-              <a:t>11/8/2021</a:t>
+              <a:t>11/30/2021</a:t>
             </a:fld>
             <a:endParaRPr lang="en-US"/>
           </a:p>
@@ -3712,7 +3712,7 @@
           <a:p>
             <a:fld id="{8F72BA41-EC5B-4197-BCC8-0FD2E523CD7A}" type="datetimeFigureOut">
               <a:rPr lang="en-US" smtClean="0"/>
-              <a:t>11/8/2021</a:t>
+              <a:t>11/30/2021</a:t>
             </a:fld>
             <a:endParaRPr lang="en-US"/>
           </a:p>
@@ -3911,7 +3911,7 @@
           <a:p>
             <a:fld id="{8F72BA41-EC5B-4197-BCC8-0FD2E523CD7A}" type="datetimeFigureOut">
               <a:rPr lang="en-US" smtClean="0"/>
-              <a:t>11/8/2021</a:t>
+              <a:t>11/30/2021</a:t>
             </a:fld>
             <a:endParaRPr lang="en-US"/>
           </a:p>
@@ -5701,7 +5701,7 @@
           <a:p>
             <a:fld id="{8F72BA41-EC5B-4197-BCC8-0FD2E523CD7A}" type="datetimeFigureOut">
               <a:rPr lang="en-US" smtClean="0"/>
-              <a:t>11/8/2021</a:t>
+              <a:t>11/30/2021</a:t>
             </a:fld>
             <a:endParaRPr lang="en-US"/>
           </a:p>
@@ -5974,7 +5974,7 @@
           <a:p>
             <a:fld id="{8F72BA41-EC5B-4197-BCC8-0FD2E523CD7A}" type="datetimeFigureOut">
               <a:rPr lang="en-US" smtClean="0"/>
-              <a:t>11/8/2021</a:t>
+              <a:t>11/30/2021</a:t>
             </a:fld>
             <a:endParaRPr lang="en-US"/>
           </a:p>
@@ -6394,7 +6394,7 @@
           <a:p>
             <a:fld id="{8F72BA41-EC5B-4197-BCC8-0FD2E523CD7A}" type="datetimeFigureOut">
               <a:rPr lang="en-US" smtClean="0"/>
-              <a:t>11/8/2021</a:t>
+              <a:t>11/30/2021</a:t>
             </a:fld>
             <a:endParaRPr lang="en-US"/>
           </a:p>
@@ -6550,7 +6550,7 @@
           <a:p>
             <a:fld id="{8F72BA41-EC5B-4197-BCC8-0FD2E523CD7A}" type="datetimeFigureOut">
               <a:rPr lang="en-US" smtClean="0"/>
-              <a:t>11/8/2021</a:t>
+              <a:t>11/30/2021</a:t>
             </a:fld>
             <a:endParaRPr lang="en-US"/>
           </a:p>
@@ -8118,7 +8118,7 @@
           <a:p>
             <a:fld id="{8F72BA41-EC5B-4197-BCC8-0FD2E523CD7A}" type="datetimeFigureOut">
               <a:rPr lang="en-US" smtClean="0"/>
-              <a:t>11/8/2021</a:t>
+              <a:t>11/30/2021</a:t>
             </a:fld>
             <a:endParaRPr lang="en-US"/>
           </a:p>
@@ -9969,7 +9969,7 @@
           <a:p>
             <a:fld id="{8F72BA41-EC5B-4197-BCC8-0FD2E523CD7A}" type="datetimeFigureOut">
               <a:rPr lang="en-US" smtClean="0"/>
-              <a:t>11/8/2021</a:t>
+              <a:t>11/30/2021</a:t>
             </a:fld>
             <a:endParaRPr lang="en-US"/>
           </a:p>
@@ -11782,7 +11782,7 @@
           <a:p>
             <a:fld id="{8F72BA41-EC5B-4197-BCC8-0FD2E523CD7A}" type="datetimeFigureOut">
               <a:rPr lang="en-US" smtClean="0"/>
-              <a:t>11/8/2021</a:t>
+              <a:t>11/30/2021</a:t>
             </a:fld>
             <a:endParaRPr lang="en-US"/>
           </a:p>
@@ -13476,7 +13476,7 @@
             <a:fld id="{8F72BA41-EC5B-4197-BCC8-0FD2E523CD7A}" type="datetimeFigureOut">
               <a:rPr lang="en-US" smtClean="0"/>
               <a:pPr/>
-              <a:t>11/8/2021</a:t>
+              <a:t>11/30/2021</a:t>
             </a:fld>
             <a:endParaRPr lang="en-US" dirty="0"/>
           </a:p>
@@ -14184,46 +14184,6 @@
               <a:t> </a:t>
             </a:r>
             <a:r>
-              <a:rPr lang="en-US" dirty="0" err="1">
-                <a:solidFill>
-                  <a:schemeClr val="bg1">
-                    <a:lumMod val="50000"/>
-                  </a:schemeClr>
-                </a:solidFill>
-              </a:rPr>
-              <a:t>correo</a:t>
-            </a:r>
-            <a:r>
-              <a:rPr lang="en-US" dirty="0">
-                <a:solidFill>
-                  <a:schemeClr val="bg1">
-                    <a:lumMod val="50000"/>
-                  </a:schemeClr>
-                </a:solidFill>
-              </a:rPr>
-              <a:t> </a:t>
-            </a:r>
-            <a:r>
-              <a:rPr lang="en-US" dirty="0" err="1">
-                <a:solidFill>
-                  <a:schemeClr val="bg1">
-                    <a:lumMod val="50000"/>
-                  </a:schemeClr>
-                </a:solidFill>
-              </a:rPr>
-              <a:t>electr</a:t>
-            </a:r>
-            <a:r>
-              <a:rPr lang="es-VE" dirty="0" err="1">
-                <a:solidFill>
-                  <a:schemeClr val="bg1">
-                    <a:lumMod val="50000"/>
-                  </a:schemeClr>
-                </a:solidFill>
-              </a:rPr>
-              <a:t>ónico</a:t>
-            </a:r>
-            <a:r>
               <a:rPr lang="es-VE" dirty="0">
                 <a:solidFill>
                   <a:schemeClr val="bg1">
@@ -14231,7 +14191,7 @@
                   </a:schemeClr>
                 </a:solidFill>
               </a:rPr>
-              <a:t> o nombre de usuario</a:t>
+              <a:t>nombre de usuario</a:t>
             </a:r>
             <a:endParaRPr lang="en-US" dirty="0">
               <a:solidFill>
@@ -16543,8 +16503,8 @@
         </p:nvSpPr>
         <p:spPr>
           <a:xfrm>
-            <a:off x="337350" y="1359761"/>
-            <a:ext cx="11505461" cy="4054449"/>
+            <a:off x="337350" y="1241571"/>
+            <a:ext cx="11505461" cy="4549277"/>
           </a:xfrm>
           <a:prstGeom prst="rect">
             <a:avLst/>
@@ -16601,7 +16561,7 @@
         </p:nvSpPr>
         <p:spPr>
           <a:xfrm>
-            <a:off x="3607292" y="1577130"/>
+            <a:off x="3726420" y="1474834"/>
             <a:ext cx="2706110" cy="400110"/>
           </a:xfrm>
           <a:prstGeom prst="rect">
@@ -16740,7 +16700,7 @@
         </p:nvSpPr>
         <p:spPr>
           <a:xfrm>
-            <a:off x="8968117" y="5620148"/>
+            <a:off x="8968117" y="5912556"/>
             <a:ext cx="2782036" cy="717205"/>
           </a:xfrm>
           <a:prstGeom prst="roundRect">
@@ -16804,7 +16764,7 @@
         </p:nvSpPr>
         <p:spPr>
           <a:xfrm>
-            <a:off x="3607292" y="2105409"/>
+            <a:off x="3726420" y="2531392"/>
             <a:ext cx="2706110" cy="400110"/>
           </a:xfrm>
           <a:prstGeom prst="rect">
@@ -16833,7 +16793,7 @@
                   </a:outerShdw>
                 </a:effectLst>
               </a:rPr>
-              <a:t>Apellidos</a:t>
+              <a:t>Apellido</a:t>
             </a:r>
             <a:r>
               <a:rPr lang="en-US" sz="2000" b="0" cap="none" spc="0" dirty="0">
@@ -16849,7 +16809,7 @@
                   </a:outerShdw>
                 </a:effectLst>
               </a:rPr>
-              <a:t>:</a:t>
+              <a:t> 2:</a:t>
             </a:r>
           </a:p>
         </p:txBody>
@@ -16868,7 +16828,7 @@
         </p:nvSpPr>
         <p:spPr>
           <a:xfrm>
-            <a:off x="3726420" y="2633688"/>
+            <a:off x="3726420" y="3059671"/>
             <a:ext cx="2706110" cy="400110"/>
           </a:xfrm>
           <a:prstGeom prst="rect">
@@ -16964,7 +16924,7 @@
         </p:nvSpPr>
         <p:spPr>
           <a:xfrm>
-            <a:off x="3607292" y="3154224"/>
+            <a:off x="3726420" y="3570945"/>
             <a:ext cx="2706110" cy="400110"/>
           </a:xfrm>
           <a:prstGeom prst="rect">
@@ -17012,7 +16972,7 @@
         </p:nvSpPr>
         <p:spPr>
           <a:xfrm>
-            <a:off x="6687024" y="1577130"/>
+            <a:off x="6687024" y="1474834"/>
             <a:ext cx="4562186" cy="400111"/>
           </a:xfrm>
           <a:prstGeom prst="roundRect">
@@ -17068,7 +17028,7 @@
         </p:nvSpPr>
         <p:spPr>
           <a:xfrm>
-            <a:off x="6687024" y="2105409"/>
+            <a:off x="6687024" y="2003113"/>
             <a:ext cx="4562186" cy="400111"/>
           </a:xfrm>
           <a:prstGeom prst="roundRect">
@@ -17124,7 +17084,7 @@
         </p:nvSpPr>
         <p:spPr>
           <a:xfrm>
-            <a:off x="6687024" y="2633688"/>
+            <a:off x="6687024" y="2531392"/>
             <a:ext cx="4562186" cy="400111"/>
           </a:xfrm>
           <a:prstGeom prst="roundRect">
@@ -17180,7 +17140,7 @@
         </p:nvSpPr>
         <p:spPr>
           <a:xfrm>
-            <a:off x="6687024" y="3161967"/>
+            <a:off x="6687024" y="3059671"/>
             <a:ext cx="4562186" cy="400111"/>
           </a:xfrm>
           <a:prstGeom prst="roundRect">
@@ -17300,7 +17260,7 @@
         </p:nvSpPr>
         <p:spPr>
           <a:xfrm>
-            <a:off x="6687024" y="3673241"/>
+            <a:off x="6687024" y="3570945"/>
             <a:ext cx="4562186" cy="400111"/>
           </a:xfrm>
           <a:prstGeom prst="roundRect">
@@ -17356,7 +17316,7 @@
         </p:nvSpPr>
         <p:spPr>
           <a:xfrm>
-            <a:off x="3726420" y="3674491"/>
+            <a:off x="3744997" y="4102481"/>
             <a:ext cx="2706110" cy="400110"/>
           </a:xfrm>
           <a:prstGeom prst="rect">
@@ -17462,7 +17422,7 @@
         </p:nvSpPr>
         <p:spPr>
           <a:xfrm>
-            <a:off x="3726420" y="4223928"/>
+            <a:off x="3767024" y="4624484"/>
             <a:ext cx="2706110" cy="400110"/>
           </a:xfrm>
           <a:prstGeom prst="rect">
@@ -17536,7 +17496,7 @@
         </p:nvSpPr>
         <p:spPr>
           <a:xfrm>
-            <a:off x="6675185" y="4200010"/>
+            <a:off x="6675185" y="4097714"/>
             <a:ext cx="4562186" cy="400111"/>
           </a:xfrm>
           <a:prstGeom prst="roundRect">
@@ -17592,7 +17552,7 @@
         </p:nvSpPr>
         <p:spPr>
           <a:xfrm>
-            <a:off x="6675185" y="4726779"/>
+            <a:off x="6675185" y="4624483"/>
             <a:ext cx="4562186" cy="400111"/>
           </a:xfrm>
           <a:prstGeom prst="roundRect">
@@ -17648,7 +17608,7 @@
         </p:nvSpPr>
         <p:spPr>
           <a:xfrm>
-            <a:off x="3505424" y="4729159"/>
+            <a:off x="3546028" y="5146303"/>
             <a:ext cx="3148102" cy="400110"/>
           </a:xfrm>
           <a:prstGeom prst="rect">
@@ -17737,6 +17697,126 @@
                 </a:outerShdw>
               </a:effectLst>
             </a:endParaRPr>
+          </a:p>
+        </p:txBody>
+      </p:sp>
+      <p:sp>
+        <p:nvSpPr>
+          <p:cNvPr id="25" name="Rectangle: Rounded Corners 7">
+            <a:extLst>
+              <a:ext uri="{FF2B5EF4-FFF2-40B4-BE49-F238E27FC236}">
+                <a16:creationId xmlns:a16="http://schemas.microsoft.com/office/drawing/2014/main" id="{1CBA1C72-5837-48FC-8C36-F0E9F4E6C0A1}"/>
+              </a:ext>
+            </a:extLst>
+          </p:cNvPr>
+          <p:cNvSpPr/>
+          <p:nvPr/>
+        </p:nvSpPr>
+        <p:spPr>
+          <a:xfrm>
+            <a:off x="6675185" y="5146302"/>
+            <a:ext cx="4562186" cy="400111"/>
+          </a:xfrm>
+          <a:prstGeom prst="roundRect">
+            <a:avLst/>
+          </a:prstGeom>
+          <a:solidFill>
+            <a:schemeClr val="bg1"/>
+          </a:solidFill>
+          <a:ln>
+            <a:noFill/>
+          </a:ln>
+        </p:spPr>
+        <p:style>
+          <a:lnRef idx="2">
+            <a:schemeClr val="accent1">
+              <a:shade val="50000"/>
+            </a:schemeClr>
+          </a:lnRef>
+          <a:fillRef idx="1">
+            <a:schemeClr val="accent1"/>
+          </a:fillRef>
+          <a:effectRef idx="0">
+            <a:schemeClr val="accent1"/>
+          </a:effectRef>
+          <a:fontRef idx="minor">
+            <a:schemeClr val="lt1"/>
+          </a:fontRef>
+        </p:style>
+        <p:txBody>
+          <a:bodyPr rtlCol="0" anchor="ctr"/>
+          <a:lstStyle/>
+          <a:p>
+            <a:pPr algn="ctr"/>
+            <a:endParaRPr lang="en-US" sz="2000" dirty="0">
+              <a:solidFill>
+                <a:schemeClr val="bg1"/>
+              </a:solidFill>
+            </a:endParaRPr>
+          </a:p>
+        </p:txBody>
+      </p:sp>
+      <p:sp>
+        <p:nvSpPr>
+          <p:cNvPr id="27" name="Rectangle 7">
+            <a:extLst>
+              <a:ext uri="{FF2B5EF4-FFF2-40B4-BE49-F238E27FC236}">
+                <a16:creationId xmlns:a16="http://schemas.microsoft.com/office/drawing/2014/main" id="{9F3BF33C-D073-4AF1-98C3-77A70E5D450A}"/>
+              </a:ext>
+            </a:extLst>
+          </p:cNvPr>
+          <p:cNvSpPr/>
+          <p:nvPr/>
+        </p:nvSpPr>
+        <p:spPr>
+          <a:xfrm>
+            <a:off x="3726420" y="1982978"/>
+            <a:ext cx="2706110" cy="400110"/>
+          </a:xfrm>
+          <a:prstGeom prst="rect">
+            <a:avLst/>
+          </a:prstGeom>
+          <a:noFill/>
+        </p:spPr>
+        <p:txBody>
+          <a:bodyPr wrap="square" lIns="91440" tIns="45720" rIns="91440" bIns="45720">
+            <a:spAutoFit/>
+          </a:bodyPr>
+          <a:lstStyle/>
+          <a:p>
+            <a:pPr algn="ctr"/>
+            <a:r>
+              <a:rPr lang="en-US" sz="2000" b="0" cap="none" spc="0" dirty="0" err="1">
+                <a:ln w="0"/>
+                <a:solidFill>
+                  <a:schemeClr val="tx1"/>
+                </a:solidFill>
+                <a:effectLst>
+                  <a:outerShdw blurRad="38100" dist="19050" dir="2700000" algn="tl" rotWithShape="0">
+                    <a:schemeClr val="dk1">
+                      <a:alpha val="40000"/>
+                    </a:schemeClr>
+                  </a:outerShdw>
+                </a:effectLst>
+              </a:rPr>
+              <a:t>Apellido</a:t>
+            </a:r>
+            <a:r>
+              <a:rPr lang="en-US" sz="2000" b="0" cap="none" spc="0" dirty="0">
+                <a:ln w="0"/>
+                <a:solidFill>
+                  <a:schemeClr val="tx1"/>
+                </a:solidFill>
+                <a:effectLst>
+                  <a:outerShdw blurRad="38100" dist="19050" dir="2700000" algn="tl" rotWithShape="0">
+                    <a:schemeClr val="dk1">
+                      <a:alpha val="40000"/>
+                    </a:schemeClr>
+                  </a:outerShdw>
+                </a:effectLst>
+              </a:rPr>
+              <a:t> 1:</a:t>
+            </a:r>
           </a:p>
         </p:txBody>
       </p:sp>

</xml_diff>

<commit_message>
Wireframe modificado y quitado boton de catsitter del perfil
</commit_message>
<xml_diff>
--- a/Docs/wireframe cat-attack.pptx
+++ b/Docs/wireframe cat-attack.pptx
@@ -1788,7 +1788,7 @@
           <a:p>
             <a:fld id="{8F72BA41-EC5B-4197-BCC8-0FD2E523CD7A}" type="datetimeFigureOut">
               <a:rPr lang="en-US" smtClean="0"/>
-              <a:t>11/30/2021</a:t>
+              <a:t>1/4/2022</a:t>
             </a:fld>
             <a:endParaRPr lang="en-US"/>
           </a:p>
@@ -1847,7 +1847,7 @@
           <a:p>
             <a:fld id="{BE15108C-154A-4A5A-9C05-91A49A422BA7}" type="slidenum">
               <a:rPr lang="en-US" smtClean="0"/>
-              <a:t>‹Nº›</a:t>
+              <a:t>‹#›</a:t>
             </a:fld>
             <a:endParaRPr lang="en-US"/>
           </a:p>
@@ -1991,7 +1991,7 @@
           <a:p>
             <a:fld id="{8F72BA41-EC5B-4197-BCC8-0FD2E523CD7A}" type="datetimeFigureOut">
               <a:rPr lang="en-US" smtClean="0"/>
-              <a:t>11/30/2021</a:t>
+              <a:t>1/4/2022</a:t>
             </a:fld>
             <a:endParaRPr lang="en-US"/>
           </a:p>
@@ -2045,7 +2045,7 @@
           <a:p>
             <a:fld id="{BE15108C-154A-4A5A-9C05-91A49A422BA7}" type="slidenum">
               <a:rPr lang="en-US" smtClean="0"/>
-              <a:t>‹Nº›</a:t>
+              <a:t>‹#›</a:t>
             </a:fld>
             <a:endParaRPr lang="en-US"/>
           </a:p>
@@ -3712,7 +3712,7 @@
           <a:p>
             <a:fld id="{8F72BA41-EC5B-4197-BCC8-0FD2E523CD7A}" type="datetimeFigureOut">
               <a:rPr lang="en-US" smtClean="0"/>
-              <a:t>11/30/2021</a:t>
+              <a:t>1/4/2022</a:t>
             </a:fld>
             <a:endParaRPr lang="en-US"/>
           </a:p>
@@ -3766,7 +3766,7 @@
           <a:p>
             <a:fld id="{BE15108C-154A-4A5A-9C05-91A49A422BA7}" type="slidenum">
               <a:rPr lang="en-US" smtClean="0"/>
-              <a:t>‹Nº›</a:t>
+              <a:t>‹#›</a:t>
             </a:fld>
             <a:endParaRPr lang="en-US"/>
           </a:p>
@@ -3911,7 +3911,7 @@
           <a:p>
             <a:fld id="{8F72BA41-EC5B-4197-BCC8-0FD2E523CD7A}" type="datetimeFigureOut">
               <a:rPr lang="en-US" smtClean="0"/>
-              <a:t>11/30/2021</a:t>
+              <a:t>1/4/2022</a:t>
             </a:fld>
             <a:endParaRPr lang="en-US"/>
           </a:p>
@@ -3965,7 +3965,7 @@
           <a:p>
             <a:fld id="{BE15108C-154A-4A5A-9C05-91A49A422BA7}" type="slidenum">
               <a:rPr lang="en-US" smtClean="0"/>
-              <a:t>‹Nº›</a:t>
+              <a:t>‹#›</a:t>
             </a:fld>
             <a:endParaRPr lang="en-US"/>
           </a:p>
@@ -5701,7 +5701,7 @@
           <a:p>
             <a:fld id="{8F72BA41-EC5B-4197-BCC8-0FD2E523CD7A}" type="datetimeFigureOut">
               <a:rPr lang="en-US" smtClean="0"/>
-              <a:t>11/30/2021</a:t>
+              <a:t>1/4/2022</a:t>
             </a:fld>
             <a:endParaRPr lang="en-US"/>
           </a:p>
@@ -5755,7 +5755,7 @@
           <a:p>
             <a:fld id="{BE15108C-154A-4A5A-9C05-91A49A422BA7}" type="slidenum">
               <a:rPr lang="en-US" smtClean="0"/>
-              <a:t>‹Nº›</a:t>
+              <a:t>‹#›</a:t>
             </a:fld>
             <a:endParaRPr lang="en-US"/>
           </a:p>
@@ -5974,7 +5974,7 @@
           <a:p>
             <a:fld id="{8F72BA41-EC5B-4197-BCC8-0FD2E523CD7A}" type="datetimeFigureOut">
               <a:rPr lang="en-US" smtClean="0"/>
-              <a:t>11/30/2021</a:t>
+              <a:t>1/4/2022</a:t>
             </a:fld>
             <a:endParaRPr lang="en-US"/>
           </a:p>
@@ -6028,7 +6028,7 @@
           <a:p>
             <a:fld id="{BE15108C-154A-4A5A-9C05-91A49A422BA7}" type="slidenum">
               <a:rPr lang="en-US" smtClean="0"/>
-              <a:t>‹Nº›</a:t>
+              <a:t>‹#›</a:t>
             </a:fld>
             <a:endParaRPr lang="en-US"/>
           </a:p>
@@ -6394,7 +6394,7 @@
           <a:p>
             <a:fld id="{8F72BA41-EC5B-4197-BCC8-0FD2E523CD7A}" type="datetimeFigureOut">
               <a:rPr lang="en-US" smtClean="0"/>
-              <a:t>11/30/2021</a:t>
+              <a:t>1/4/2022</a:t>
             </a:fld>
             <a:endParaRPr lang="en-US"/>
           </a:p>
@@ -6453,7 +6453,7 @@
           <a:p>
             <a:fld id="{BE15108C-154A-4A5A-9C05-91A49A422BA7}" type="slidenum">
               <a:rPr lang="en-US" smtClean="0"/>
-              <a:t>‹Nº›</a:t>
+              <a:t>‹#›</a:t>
             </a:fld>
             <a:endParaRPr lang="en-US"/>
           </a:p>
@@ -6550,7 +6550,7 @@
           <a:p>
             <a:fld id="{8F72BA41-EC5B-4197-BCC8-0FD2E523CD7A}" type="datetimeFigureOut">
               <a:rPr lang="en-US" smtClean="0"/>
-              <a:t>11/30/2021</a:t>
+              <a:t>1/4/2022</a:t>
             </a:fld>
             <a:endParaRPr lang="en-US"/>
           </a:p>
@@ -6609,7 +6609,7 @@
           <a:p>
             <a:fld id="{BE15108C-154A-4A5A-9C05-91A49A422BA7}" type="slidenum">
               <a:rPr lang="en-US" smtClean="0"/>
-              <a:t>‹Nº›</a:t>
+              <a:t>‹#›</a:t>
             </a:fld>
             <a:endParaRPr lang="en-US"/>
           </a:p>
@@ -8118,7 +8118,7 @@
           <a:p>
             <a:fld id="{8F72BA41-EC5B-4197-BCC8-0FD2E523CD7A}" type="datetimeFigureOut">
               <a:rPr lang="en-US" smtClean="0"/>
-              <a:t>11/30/2021</a:t>
+              <a:t>1/4/2022</a:t>
             </a:fld>
             <a:endParaRPr lang="en-US"/>
           </a:p>
@@ -8172,7 +8172,7 @@
           <a:p>
             <a:fld id="{BE15108C-154A-4A5A-9C05-91A49A422BA7}" type="slidenum">
               <a:rPr lang="en-US" smtClean="0"/>
-              <a:t>‹Nº›</a:t>
+              <a:t>‹#›</a:t>
             </a:fld>
             <a:endParaRPr lang="en-US"/>
           </a:p>
@@ -9969,7 +9969,7 @@
           <a:p>
             <a:fld id="{8F72BA41-EC5B-4197-BCC8-0FD2E523CD7A}" type="datetimeFigureOut">
               <a:rPr lang="en-US" smtClean="0"/>
-              <a:t>11/30/2021</a:t>
+              <a:t>1/4/2022</a:t>
             </a:fld>
             <a:endParaRPr lang="en-US"/>
           </a:p>
@@ -10023,7 +10023,7 @@
           <a:p>
             <a:fld id="{BE15108C-154A-4A5A-9C05-91A49A422BA7}" type="slidenum">
               <a:rPr lang="en-US" smtClean="0"/>
-              <a:t>‹Nº›</a:t>
+              <a:t>‹#›</a:t>
             </a:fld>
             <a:endParaRPr lang="en-US"/>
           </a:p>
@@ -11782,7 +11782,7 @@
           <a:p>
             <a:fld id="{8F72BA41-EC5B-4197-BCC8-0FD2E523CD7A}" type="datetimeFigureOut">
               <a:rPr lang="en-US" smtClean="0"/>
-              <a:t>11/30/2021</a:t>
+              <a:t>1/4/2022</a:t>
             </a:fld>
             <a:endParaRPr lang="en-US"/>
           </a:p>
@@ -11836,7 +11836,7 @@
           <a:p>
             <a:fld id="{BE15108C-154A-4A5A-9C05-91A49A422BA7}" type="slidenum">
               <a:rPr lang="en-US" smtClean="0"/>
-              <a:t>‹Nº›</a:t>
+              <a:t>‹#›</a:t>
             </a:fld>
             <a:endParaRPr lang="en-US"/>
           </a:p>
@@ -13476,7 +13476,7 @@
             <a:fld id="{8F72BA41-EC5B-4197-BCC8-0FD2E523CD7A}" type="datetimeFigureOut">
               <a:rPr lang="en-US" smtClean="0"/>
               <a:pPr/>
-              <a:t>11/30/2021</a:t>
+              <a:t>1/4/2022</a:t>
             </a:fld>
             <a:endParaRPr lang="en-US" dirty="0"/>
           </a:p>
@@ -13567,7 +13567,7 @@
             <a:fld id="{BE15108C-154A-4A5A-9C05-91A49A422BA7}" type="slidenum">
               <a:rPr lang="en-US" smtClean="0"/>
               <a:pPr/>
-              <a:t>‹Nº›</a:t>
+              <a:t>‹#›</a:t>
             </a:fld>
             <a:endParaRPr lang="en-US" dirty="0"/>
           </a:p>
@@ -18307,7 +18307,7 @@
         </p:nvSpPr>
         <p:spPr>
           <a:xfrm>
-            <a:off x="337350" y="1359762"/>
+            <a:off x="337350" y="2141813"/>
             <a:ext cx="11505461" cy="2069238"/>
           </a:xfrm>
           <a:prstGeom prst="rect">
@@ -18365,7 +18365,7 @@
         </p:nvSpPr>
         <p:spPr>
           <a:xfrm>
-            <a:off x="3616787" y="1509204"/>
+            <a:off x="3616787" y="2291255"/>
             <a:ext cx="4637808" cy="1631216"/>
           </a:xfrm>
           <a:prstGeom prst="rect">
@@ -18537,7 +18537,7 @@
         </p:nvSpPr>
         <p:spPr>
           <a:xfrm>
-            <a:off x="559293" y="1509204"/>
+            <a:off x="559293" y="2291255"/>
             <a:ext cx="2805344" cy="1713390"/>
           </a:xfrm>
           <a:prstGeom prst="rect">
@@ -18601,7 +18601,7 @@
         </p:nvSpPr>
         <p:spPr>
           <a:xfrm>
-            <a:off x="337350" y="3670176"/>
+            <a:off x="337350" y="4452227"/>
             <a:ext cx="11505461" cy="2069238"/>
           </a:xfrm>
           <a:prstGeom prst="rect">
@@ -18659,7 +18659,7 @@
         </p:nvSpPr>
         <p:spPr>
           <a:xfrm>
-            <a:off x="3616787" y="3819618"/>
+            <a:off x="3616787" y="4601669"/>
             <a:ext cx="4637808" cy="1631216"/>
           </a:xfrm>
           <a:prstGeom prst="rect">
@@ -18831,7 +18831,7 @@
         </p:nvSpPr>
         <p:spPr>
           <a:xfrm>
-            <a:off x="559293" y="3819618"/>
+            <a:off x="559293" y="4601669"/>
             <a:ext cx="2805344" cy="1713390"/>
           </a:xfrm>
           <a:prstGeom prst="rect">
@@ -19018,7 +19018,7 @@
         </p:nvSpPr>
         <p:spPr>
           <a:xfrm>
-            <a:off x="10880522" y="1509204"/>
+            <a:off x="10880522" y="2291255"/>
             <a:ext cx="813732" cy="759558"/>
           </a:xfrm>
           <a:prstGeom prst="triangle">
@@ -19067,7 +19067,7 @@
         </p:nvSpPr>
         <p:spPr>
           <a:xfrm>
-            <a:off x="11133546" y="1623118"/>
+            <a:off x="11133546" y="2405169"/>
             <a:ext cx="314510" cy="707886"/>
           </a:xfrm>
           <a:prstGeom prst="rect">
@@ -19124,7 +19124,7 @@
         </p:nvSpPr>
         <p:spPr>
           <a:xfrm>
-            <a:off x="10880522" y="3819618"/>
+            <a:off x="10880522" y="4601669"/>
             <a:ext cx="813732" cy="759558"/>
           </a:xfrm>
           <a:prstGeom prst="triangle">
@@ -19173,7 +19173,7 @@
         </p:nvSpPr>
         <p:spPr>
           <a:xfrm>
-            <a:off x="11133546" y="3933532"/>
+            <a:off x="11133546" y="4715583"/>
             <a:ext cx="314510" cy="707886"/>
           </a:xfrm>
           <a:prstGeom prst="rect">
@@ -19201,6 +19201,117 @@
               <a:t>!</a:t>
             </a:r>
             <a:endParaRPr lang="en-US" sz="4000" b="1" cap="none" spc="0" dirty="0">
+              <a:ln w="0"/>
+              <a:solidFill>
+                <a:schemeClr val="tx1"/>
+              </a:solidFill>
+              <a:effectLst>
+                <a:outerShdw blurRad="38100" dist="19050" dir="2700000" algn="tl" rotWithShape="0">
+                  <a:schemeClr val="dk1">
+                    <a:alpha val="40000"/>
+                  </a:schemeClr>
+                </a:outerShdw>
+              </a:effectLst>
+            </a:endParaRPr>
+          </a:p>
+        </p:txBody>
+      </p:sp>
+      <p:sp>
+        <p:nvSpPr>
+          <p:cNvPr id="18" name="Rectangle: Rounded Corners 17">
+            <a:extLst>
+              <a:ext uri="{FF2B5EF4-FFF2-40B4-BE49-F238E27FC236}">
+                <a16:creationId xmlns:a16="http://schemas.microsoft.com/office/drawing/2014/main" id="{CB988D80-EF70-4390-9055-A4323551C93B}"/>
+              </a:ext>
+            </a:extLst>
+          </p:cNvPr>
+          <p:cNvSpPr/>
+          <p:nvPr/>
+        </p:nvSpPr>
+        <p:spPr>
+          <a:xfrm>
+            <a:off x="8518358" y="1431755"/>
+            <a:ext cx="3324453" cy="603523"/>
+          </a:xfrm>
+          <a:prstGeom prst="roundRect">
+            <a:avLst/>
+          </a:prstGeom>
+          <a:noFill/>
+          <a:ln w="28575">
+            <a:solidFill>
+              <a:schemeClr val="tx1"/>
+            </a:solidFill>
+          </a:ln>
+        </p:spPr>
+        <p:style>
+          <a:lnRef idx="2">
+            <a:schemeClr val="accent6"/>
+          </a:lnRef>
+          <a:fillRef idx="1">
+            <a:schemeClr val="lt1"/>
+          </a:fillRef>
+          <a:effectRef idx="0">
+            <a:schemeClr val="accent6"/>
+          </a:effectRef>
+          <a:fontRef idx="minor">
+            <a:schemeClr val="dk1"/>
+          </a:fontRef>
+        </p:style>
+        <p:txBody>
+          <a:bodyPr rtlCol="0" anchor="ctr"/>
+          <a:lstStyle/>
+          <a:p>
+            <a:pPr algn="ctr"/>
+            <a:endParaRPr lang="en-US"/>
+          </a:p>
+        </p:txBody>
+      </p:sp>
+      <p:sp>
+        <p:nvSpPr>
+          <p:cNvPr id="19" name="Rectangle 18">
+            <a:extLst>
+              <a:ext uri="{FF2B5EF4-FFF2-40B4-BE49-F238E27FC236}">
+                <a16:creationId xmlns:a16="http://schemas.microsoft.com/office/drawing/2014/main" id="{2614BCA0-B305-43F2-B239-0B9D063CBC0B}"/>
+              </a:ext>
+            </a:extLst>
+          </p:cNvPr>
+          <p:cNvSpPr/>
+          <p:nvPr/>
+        </p:nvSpPr>
+        <p:spPr>
+          <a:xfrm>
+            <a:off x="8541023" y="1528686"/>
+            <a:ext cx="3278463" cy="400110"/>
+          </a:xfrm>
+          <a:prstGeom prst="rect">
+            <a:avLst/>
+          </a:prstGeom>
+          <a:noFill/>
+        </p:spPr>
+        <p:txBody>
+          <a:bodyPr wrap="none" lIns="91440" tIns="45720" rIns="91440" bIns="45720">
+            <a:spAutoFit/>
+          </a:bodyPr>
+          <a:lstStyle/>
+          <a:p>
+            <a:pPr algn="ctr"/>
+            <a:r>
+              <a:rPr lang="es-VE" sz="2000" b="0" cap="none" spc="0" dirty="0">
+                <a:ln w="0"/>
+                <a:solidFill>
+                  <a:schemeClr val="tx1"/>
+                </a:solidFill>
+                <a:effectLst>
+                  <a:outerShdw blurRad="38100" dist="19050" dir="2700000" algn="tl" rotWithShape="0">
+                    <a:schemeClr val="dk1">
+                      <a:alpha val="40000"/>
+                    </a:schemeClr>
+                  </a:outerShdw>
+                </a:effectLst>
+              </a:rPr>
+              <a:t>Poner un gato en adopción</a:t>
+            </a:r>
+            <a:endParaRPr lang="en-US" sz="2000" b="0" cap="none" spc="0" dirty="0">
               <a:ln w="0"/>
               <a:solidFill>
                 <a:schemeClr val="tx1"/>
@@ -20515,7 +20626,7 @@
         </p:nvSpPr>
         <p:spPr>
           <a:xfrm>
-            <a:off x="337350" y="1359762"/>
+            <a:off x="337350" y="2238066"/>
             <a:ext cx="11505461" cy="2069238"/>
           </a:xfrm>
           <a:prstGeom prst="rect">
@@ -20573,7 +20684,7 @@
         </p:nvSpPr>
         <p:spPr>
           <a:xfrm>
-            <a:off x="3546255" y="1509204"/>
+            <a:off x="3546255" y="2387508"/>
             <a:ext cx="2598789" cy="1569660"/>
           </a:xfrm>
           <a:prstGeom prst="rect">
@@ -20681,7 +20792,7 @@
         </p:nvSpPr>
         <p:spPr>
           <a:xfrm>
-            <a:off x="559293" y="1509204"/>
+            <a:off x="559293" y="2387508"/>
             <a:ext cx="2805344" cy="1713390"/>
           </a:xfrm>
           <a:prstGeom prst="rect">
@@ -20745,7 +20856,7 @@
         </p:nvSpPr>
         <p:spPr>
           <a:xfrm>
-            <a:off x="337350" y="3670176"/>
+            <a:off x="337350" y="4548480"/>
             <a:ext cx="11505461" cy="2069238"/>
           </a:xfrm>
           <a:prstGeom prst="rect">
@@ -20803,7 +20914,7 @@
         </p:nvSpPr>
         <p:spPr>
           <a:xfrm>
-            <a:off x="3546254" y="3891483"/>
+            <a:off x="3546254" y="4769787"/>
             <a:ext cx="2598789" cy="1569660"/>
           </a:xfrm>
           <a:prstGeom prst="rect">
@@ -20911,7 +21022,7 @@
         </p:nvSpPr>
         <p:spPr>
           <a:xfrm>
-            <a:off x="559293" y="3819618"/>
+            <a:off x="559293" y="4697922"/>
             <a:ext cx="2805344" cy="1713390"/>
           </a:xfrm>
           <a:prstGeom prst="rect">
@@ -20958,660 +21069,6 @@
                 <a:schemeClr val="tx1"/>
               </a:solidFill>
             </a:endParaRPr>
-          </a:p>
-        </p:txBody>
-      </p:sp>
-      <p:sp>
-        <p:nvSpPr>
-          <p:cNvPr id="14" name="Rectangle 10">
-            <a:extLst>
-              <a:ext uri="{FF2B5EF4-FFF2-40B4-BE49-F238E27FC236}">
-                <a16:creationId xmlns:a16="http://schemas.microsoft.com/office/drawing/2014/main" id="{1FF85E92-B7AD-4BCA-AA7E-28CE58E69FBD}"/>
-              </a:ext>
-            </a:extLst>
-          </p:cNvPr>
-          <p:cNvSpPr/>
-          <p:nvPr/>
-        </p:nvSpPr>
-        <p:spPr>
-          <a:xfrm>
-            <a:off x="7528195" y="1509204"/>
-            <a:ext cx="1420582" cy="400110"/>
-          </a:xfrm>
-          <a:prstGeom prst="rect">
-            <a:avLst/>
-          </a:prstGeom>
-          <a:noFill/>
-        </p:spPr>
-        <p:txBody>
-          <a:bodyPr wrap="none" lIns="91440" tIns="45720" rIns="91440" bIns="45720">
-            <a:spAutoFit/>
-          </a:bodyPr>
-          <a:lstStyle/>
-          <a:p>
-            <a:r>
-              <a:rPr lang="en-US" sz="2000" dirty="0" err="1">
-                <a:ln w="0"/>
-                <a:effectLst>
-                  <a:outerShdw blurRad="38100" dist="19050" dir="2700000" algn="tl" rotWithShape="0">
-                    <a:schemeClr val="dk1">
-                      <a:alpha val="40000"/>
-                    </a:schemeClr>
-                  </a:outerShdw>
-                </a:effectLst>
-              </a:rPr>
-              <a:t>Valoración</a:t>
-            </a:r>
-            <a:endParaRPr lang="en-US" sz="2000" b="0" cap="none" spc="0" dirty="0">
-              <a:ln w="0"/>
-              <a:solidFill>
-                <a:schemeClr val="tx1"/>
-              </a:solidFill>
-              <a:effectLst>
-                <a:outerShdw blurRad="38100" dist="19050" dir="2700000" algn="tl" rotWithShape="0">
-                  <a:schemeClr val="dk1">
-                    <a:alpha val="40000"/>
-                  </a:schemeClr>
-                </a:outerShdw>
-              </a:effectLst>
-            </a:endParaRPr>
-          </a:p>
-        </p:txBody>
-      </p:sp>
-      <p:sp>
-        <p:nvSpPr>
-          <p:cNvPr id="3" name="Estrella: 5 puntas 2">
-            <a:extLst>
-              <a:ext uri="{FF2B5EF4-FFF2-40B4-BE49-F238E27FC236}">
-                <a16:creationId xmlns:a16="http://schemas.microsoft.com/office/drawing/2014/main" id="{CA59AEE3-16BB-4B60-8F79-CB800962C72B}"/>
-              </a:ext>
-            </a:extLst>
-          </p:cNvPr>
-          <p:cNvSpPr/>
-          <p:nvPr/>
-        </p:nvSpPr>
-        <p:spPr>
-          <a:xfrm>
-            <a:off x="9612661" y="1433117"/>
-            <a:ext cx="453006" cy="476197"/>
-          </a:xfrm>
-          <a:prstGeom prst="star5">
-            <a:avLst/>
-          </a:prstGeom>
-          <a:solidFill>
-            <a:srgbClr val="FFFF00"/>
-          </a:solidFill>
-          <a:ln>
-            <a:solidFill>
-              <a:schemeClr val="tx1"/>
-            </a:solidFill>
-          </a:ln>
-        </p:spPr>
-        <p:style>
-          <a:lnRef idx="2">
-            <a:schemeClr val="accent1">
-              <a:shade val="50000"/>
-            </a:schemeClr>
-          </a:lnRef>
-          <a:fillRef idx="1">
-            <a:schemeClr val="accent1"/>
-          </a:fillRef>
-          <a:effectRef idx="0">
-            <a:schemeClr val="accent1"/>
-          </a:effectRef>
-          <a:fontRef idx="minor">
-            <a:schemeClr val="lt1"/>
-          </a:fontRef>
-        </p:style>
-        <p:txBody>
-          <a:bodyPr rtlCol="0" anchor="ctr"/>
-          <a:lstStyle/>
-          <a:p>
-            <a:pPr algn="ctr"/>
-            <a:endParaRPr lang="es-ES"/>
-          </a:p>
-        </p:txBody>
-      </p:sp>
-      <p:sp>
-        <p:nvSpPr>
-          <p:cNvPr id="15" name="Estrella: 5 puntas 14">
-            <a:extLst>
-              <a:ext uri="{FF2B5EF4-FFF2-40B4-BE49-F238E27FC236}">
-                <a16:creationId xmlns:a16="http://schemas.microsoft.com/office/drawing/2014/main" id="{FFDE9C7A-6F17-418D-8EB6-F3F063ED29C9}"/>
-              </a:ext>
-            </a:extLst>
-          </p:cNvPr>
-          <p:cNvSpPr/>
-          <p:nvPr/>
-        </p:nvSpPr>
-        <p:spPr>
-          <a:xfrm>
-            <a:off x="11304445" y="1433118"/>
-            <a:ext cx="453006" cy="476197"/>
-          </a:xfrm>
-          <a:prstGeom prst="star5">
-            <a:avLst/>
-          </a:prstGeom>
-          <a:solidFill>
-            <a:srgbClr val="FFFF00"/>
-          </a:solidFill>
-          <a:ln>
-            <a:solidFill>
-              <a:schemeClr val="tx1"/>
-            </a:solidFill>
-          </a:ln>
-        </p:spPr>
-        <p:style>
-          <a:lnRef idx="2">
-            <a:schemeClr val="accent1">
-              <a:shade val="50000"/>
-            </a:schemeClr>
-          </a:lnRef>
-          <a:fillRef idx="1">
-            <a:schemeClr val="accent1"/>
-          </a:fillRef>
-          <a:effectRef idx="0">
-            <a:schemeClr val="accent1"/>
-          </a:effectRef>
-          <a:fontRef idx="minor">
-            <a:schemeClr val="lt1"/>
-          </a:fontRef>
-        </p:style>
-        <p:txBody>
-          <a:bodyPr rtlCol="0" anchor="ctr"/>
-          <a:lstStyle/>
-          <a:p>
-            <a:pPr algn="ctr"/>
-            <a:endParaRPr lang="es-ES"/>
-          </a:p>
-        </p:txBody>
-      </p:sp>
-      <p:sp>
-        <p:nvSpPr>
-          <p:cNvPr id="16" name="Estrella: 5 puntas 15">
-            <a:extLst>
-              <a:ext uri="{FF2B5EF4-FFF2-40B4-BE49-F238E27FC236}">
-                <a16:creationId xmlns:a16="http://schemas.microsoft.com/office/drawing/2014/main" id="{1D451DFB-2F05-4E9B-82C5-3913E1784433}"/>
-              </a:ext>
-            </a:extLst>
-          </p:cNvPr>
-          <p:cNvSpPr/>
-          <p:nvPr/>
-        </p:nvSpPr>
-        <p:spPr>
-          <a:xfrm>
-            <a:off x="10730112" y="1433118"/>
-            <a:ext cx="453006" cy="476197"/>
-          </a:xfrm>
-          <a:prstGeom prst="star5">
-            <a:avLst/>
-          </a:prstGeom>
-          <a:solidFill>
-            <a:srgbClr val="FFFF00"/>
-          </a:solidFill>
-          <a:ln>
-            <a:solidFill>
-              <a:schemeClr val="tx1"/>
-            </a:solidFill>
-          </a:ln>
-        </p:spPr>
-        <p:style>
-          <a:lnRef idx="2">
-            <a:schemeClr val="accent1">
-              <a:shade val="50000"/>
-            </a:schemeClr>
-          </a:lnRef>
-          <a:fillRef idx="1">
-            <a:schemeClr val="accent1"/>
-          </a:fillRef>
-          <a:effectRef idx="0">
-            <a:schemeClr val="accent1"/>
-          </a:effectRef>
-          <a:fontRef idx="minor">
-            <a:schemeClr val="lt1"/>
-          </a:fontRef>
-        </p:style>
-        <p:txBody>
-          <a:bodyPr rtlCol="0" anchor="ctr"/>
-          <a:lstStyle/>
-          <a:p>
-            <a:pPr algn="ctr"/>
-            <a:endParaRPr lang="es-ES"/>
-          </a:p>
-        </p:txBody>
-      </p:sp>
-      <p:sp>
-        <p:nvSpPr>
-          <p:cNvPr id="17" name="Estrella: 5 puntas 16">
-            <a:extLst>
-              <a:ext uri="{FF2B5EF4-FFF2-40B4-BE49-F238E27FC236}">
-                <a16:creationId xmlns:a16="http://schemas.microsoft.com/office/drawing/2014/main" id="{D1B869E9-1071-4FDF-A6E3-DDB16F865513}"/>
-              </a:ext>
-            </a:extLst>
-          </p:cNvPr>
-          <p:cNvSpPr/>
-          <p:nvPr/>
-        </p:nvSpPr>
-        <p:spPr>
-          <a:xfrm>
-            <a:off x="10187555" y="1433117"/>
-            <a:ext cx="453006" cy="476197"/>
-          </a:xfrm>
-          <a:prstGeom prst="star5">
-            <a:avLst/>
-          </a:prstGeom>
-          <a:solidFill>
-            <a:srgbClr val="FFFF00"/>
-          </a:solidFill>
-          <a:ln>
-            <a:solidFill>
-              <a:schemeClr val="tx1"/>
-            </a:solidFill>
-          </a:ln>
-        </p:spPr>
-        <p:style>
-          <a:lnRef idx="2">
-            <a:schemeClr val="accent1">
-              <a:shade val="50000"/>
-            </a:schemeClr>
-          </a:lnRef>
-          <a:fillRef idx="1">
-            <a:schemeClr val="accent1"/>
-          </a:fillRef>
-          <a:effectRef idx="0">
-            <a:schemeClr val="accent1"/>
-          </a:effectRef>
-          <a:fontRef idx="minor">
-            <a:schemeClr val="lt1"/>
-          </a:fontRef>
-        </p:style>
-        <p:txBody>
-          <a:bodyPr rtlCol="0" anchor="ctr"/>
-          <a:lstStyle/>
-          <a:p>
-            <a:pPr algn="ctr"/>
-            <a:endParaRPr lang="es-ES"/>
-          </a:p>
-        </p:txBody>
-      </p:sp>
-      <p:sp>
-        <p:nvSpPr>
-          <p:cNvPr id="18" name="Estrella: 5 puntas 17">
-            <a:extLst>
-              <a:ext uri="{FF2B5EF4-FFF2-40B4-BE49-F238E27FC236}">
-                <a16:creationId xmlns:a16="http://schemas.microsoft.com/office/drawing/2014/main" id="{D45AA46C-8801-4CBF-8203-4CD04F51D6B6}"/>
-              </a:ext>
-            </a:extLst>
-          </p:cNvPr>
-          <p:cNvSpPr/>
-          <p:nvPr/>
-        </p:nvSpPr>
-        <p:spPr>
-          <a:xfrm>
-            <a:off x="9037604" y="1433116"/>
-            <a:ext cx="453006" cy="476197"/>
-          </a:xfrm>
-          <a:prstGeom prst="star5">
-            <a:avLst/>
-          </a:prstGeom>
-          <a:solidFill>
-            <a:srgbClr val="FFFF00"/>
-          </a:solidFill>
-          <a:ln>
-            <a:solidFill>
-              <a:schemeClr val="tx1"/>
-            </a:solidFill>
-          </a:ln>
-        </p:spPr>
-        <p:style>
-          <a:lnRef idx="2">
-            <a:schemeClr val="accent1">
-              <a:shade val="50000"/>
-            </a:schemeClr>
-          </a:lnRef>
-          <a:fillRef idx="1">
-            <a:schemeClr val="accent1"/>
-          </a:fillRef>
-          <a:effectRef idx="0">
-            <a:schemeClr val="accent1"/>
-          </a:effectRef>
-          <a:fontRef idx="minor">
-            <a:schemeClr val="lt1"/>
-          </a:fontRef>
-        </p:style>
-        <p:txBody>
-          <a:bodyPr rtlCol="0" anchor="ctr"/>
-          <a:lstStyle/>
-          <a:p>
-            <a:pPr algn="ctr"/>
-            <a:endParaRPr lang="es-ES"/>
-          </a:p>
-        </p:txBody>
-      </p:sp>
-      <p:sp>
-        <p:nvSpPr>
-          <p:cNvPr id="25" name="Rectangle 10">
-            <a:extLst>
-              <a:ext uri="{FF2B5EF4-FFF2-40B4-BE49-F238E27FC236}">
-                <a16:creationId xmlns:a16="http://schemas.microsoft.com/office/drawing/2014/main" id="{E6974BFD-FB9A-46BD-8A1D-CA363C5CA4A9}"/>
-              </a:ext>
-            </a:extLst>
-          </p:cNvPr>
-          <p:cNvSpPr/>
-          <p:nvPr/>
-        </p:nvSpPr>
-        <p:spPr>
-          <a:xfrm>
-            <a:off x="7528195" y="3819618"/>
-            <a:ext cx="1420582" cy="400110"/>
-          </a:xfrm>
-          <a:prstGeom prst="rect">
-            <a:avLst/>
-          </a:prstGeom>
-          <a:noFill/>
-        </p:spPr>
-        <p:txBody>
-          <a:bodyPr wrap="none" lIns="91440" tIns="45720" rIns="91440" bIns="45720">
-            <a:spAutoFit/>
-          </a:bodyPr>
-          <a:lstStyle/>
-          <a:p>
-            <a:r>
-              <a:rPr lang="en-US" sz="2000" dirty="0" err="1">
-                <a:ln w="0"/>
-                <a:effectLst>
-                  <a:outerShdw blurRad="38100" dist="19050" dir="2700000" algn="tl" rotWithShape="0">
-                    <a:schemeClr val="dk1">
-                      <a:alpha val="40000"/>
-                    </a:schemeClr>
-                  </a:outerShdw>
-                </a:effectLst>
-              </a:rPr>
-              <a:t>Valoración</a:t>
-            </a:r>
-            <a:endParaRPr lang="en-US" sz="2000" b="0" cap="none" spc="0" dirty="0">
-              <a:ln w="0"/>
-              <a:solidFill>
-                <a:schemeClr val="tx1"/>
-              </a:solidFill>
-              <a:effectLst>
-                <a:outerShdw blurRad="38100" dist="19050" dir="2700000" algn="tl" rotWithShape="0">
-                  <a:schemeClr val="dk1">
-                    <a:alpha val="40000"/>
-                  </a:schemeClr>
-                </a:outerShdw>
-              </a:effectLst>
-            </a:endParaRPr>
-          </a:p>
-        </p:txBody>
-      </p:sp>
-      <p:sp>
-        <p:nvSpPr>
-          <p:cNvPr id="26" name="Estrella: 5 puntas 25">
-            <a:extLst>
-              <a:ext uri="{FF2B5EF4-FFF2-40B4-BE49-F238E27FC236}">
-                <a16:creationId xmlns:a16="http://schemas.microsoft.com/office/drawing/2014/main" id="{AE8CC64F-63E2-4A8F-B759-BF5205A9D133}"/>
-              </a:ext>
-            </a:extLst>
-          </p:cNvPr>
-          <p:cNvSpPr/>
-          <p:nvPr/>
-        </p:nvSpPr>
-        <p:spPr>
-          <a:xfrm>
-            <a:off x="9612661" y="3743531"/>
-            <a:ext cx="453006" cy="476197"/>
-          </a:xfrm>
-          <a:prstGeom prst="star5">
-            <a:avLst/>
-          </a:prstGeom>
-          <a:solidFill>
-            <a:srgbClr val="FFFF00"/>
-          </a:solidFill>
-          <a:ln>
-            <a:solidFill>
-              <a:schemeClr val="tx1"/>
-            </a:solidFill>
-          </a:ln>
-        </p:spPr>
-        <p:style>
-          <a:lnRef idx="2">
-            <a:schemeClr val="accent1">
-              <a:shade val="50000"/>
-            </a:schemeClr>
-          </a:lnRef>
-          <a:fillRef idx="1">
-            <a:schemeClr val="accent1"/>
-          </a:fillRef>
-          <a:effectRef idx="0">
-            <a:schemeClr val="accent1"/>
-          </a:effectRef>
-          <a:fontRef idx="minor">
-            <a:schemeClr val="lt1"/>
-          </a:fontRef>
-        </p:style>
-        <p:txBody>
-          <a:bodyPr rtlCol="0" anchor="ctr"/>
-          <a:lstStyle/>
-          <a:p>
-            <a:pPr algn="ctr"/>
-            <a:endParaRPr lang="es-ES"/>
-          </a:p>
-        </p:txBody>
-      </p:sp>
-      <p:sp>
-        <p:nvSpPr>
-          <p:cNvPr id="27" name="Estrella: 5 puntas 26">
-            <a:extLst>
-              <a:ext uri="{FF2B5EF4-FFF2-40B4-BE49-F238E27FC236}">
-                <a16:creationId xmlns:a16="http://schemas.microsoft.com/office/drawing/2014/main" id="{5BCEDDC5-4A83-4EB6-ADA4-94C9F0C65EC5}"/>
-              </a:ext>
-            </a:extLst>
-          </p:cNvPr>
-          <p:cNvSpPr/>
-          <p:nvPr/>
-        </p:nvSpPr>
-        <p:spPr>
-          <a:xfrm>
-            <a:off x="11304445" y="3743532"/>
-            <a:ext cx="453006" cy="476197"/>
-          </a:xfrm>
-          <a:prstGeom prst="star5">
-            <a:avLst/>
-          </a:prstGeom>
-          <a:solidFill>
-            <a:srgbClr val="FFFF00"/>
-          </a:solidFill>
-          <a:ln>
-            <a:solidFill>
-              <a:schemeClr val="tx1"/>
-            </a:solidFill>
-          </a:ln>
-        </p:spPr>
-        <p:style>
-          <a:lnRef idx="2">
-            <a:schemeClr val="accent1">
-              <a:shade val="50000"/>
-            </a:schemeClr>
-          </a:lnRef>
-          <a:fillRef idx="1">
-            <a:schemeClr val="accent1"/>
-          </a:fillRef>
-          <a:effectRef idx="0">
-            <a:schemeClr val="accent1"/>
-          </a:effectRef>
-          <a:fontRef idx="minor">
-            <a:schemeClr val="lt1"/>
-          </a:fontRef>
-        </p:style>
-        <p:txBody>
-          <a:bodyPr rtlCol="0" anchor="ctr"/>
-          <a:lstStyle/>
-          <a:p>
-            <a:pPr algn="ctr"/>
-            <a:endParaRPr lang="es-ES"/>
-          </a:p>
-        </p:txBody>
-      </p:sp>
-      <p:sp>
-        <p:nvSpPr>
-          <p:cNvPr id="28" name="Estrella: 5 puntas 27">
-            <a:extLst>
-              <a:ext uri="{FF2B5EF4-FFF2-40B4-BE49-F238E27FC236}">
-                <a16:creationId xmlns:a16="http://schemas.microsoft.com/office/drawing/2014/main" id="{DC5B67EC-3090-4F7B-983A-90D4D302288B}"/>
-              </a:ext>
-            </a:extLst>
-          </p:cNvPr>
-          <p:cNvSpPr/>
-          <p:nvPr/>
-        </p:nvSpPr>
-        <p:spPr>
-          <a:xfrm>
-            <a:off x="10730112" y="3743532"/>
-            <a:ext cx="453006" cy="476197"/>
-          </a:xfrm>
-          <a:prstGeom prst="star5">
-            <a:avLst/>
-          </a:prstGeom>
-          <a:solidFill>
-            <a:srgbClr val="FFFF00"/>
-          </a:solidFill>
-          <a:ln>
-            <a:solidFill>
-              <a:schemeClr val="tx1"/>
-            </a:solidFill>
-          </a:ln>
-        </p:spPr>
-        <p:style>
-          <a:lnRef idx="2">
-            <a:schemeClr val="accent1">
-              <a:shade val="50000"/>
-            </a:schemeClr>
-          </a:lnRef>
-          <a:fillRef idx="1">
-            <a:schemeClr val="accent1"/>
-          </a:fillRef>
-          <a:effectRef idx="0">
-            <a:schemeClr val="accent1"/>
-          </a:effectRef>
-          <a:fontRef idx="minor">
-            <a:schemeClr val="lt1"/>
-          </a:fontRef>
-        </p:style>
-        <p:txBody>
-          <a:bodyPr rtlCol="0" anchor="ctr"/>
-          <a:lstStyle/>
-          <a:p>
-            <a:pPr algn="ctr"/>
-            <a:endParaRPr lang="es-ES"/>
-          </a:p>
-        </p:txBody>
-      </p:sp>
-      <p:sp>
-        <p:nvSpPr>
-          <p:cNvPr id="29" name="Estrella: 5 puntas 28">
-            <a:extLst>
-              <a:ext uri="{FF2B5EF4-FFF2-40B4-BE49-F238E27FC236}">
-                <a16:creationId xmlns:a16="http://schemas.microsoft.com/office/drawing/2014/main" id="{95871EB4-98D3-4014-B666-04314E842202}"/>
-              </a:ext>
-            </a:extLst>
-          </p:cNvPr>
-          <p:cNvSpPr/>
-          <p:nvPr/>
-        </p:nvSpPr>
-        <p:spPr>
-          <a:xfrm>
-            <a:off x="10187555" y="3743531"/>
-            <a:ext cx="453006" cy="476197"/>
-          </a:xfrm>
-          <a:prstGeom prst="star5">
-            <a:avLst/>
-          </a:prstGeom>
-          <a:solidFill>
-            <a:srgbClr val="FFFF00"/>
-          </a:solidFill>
-          <a:ln>
-            <a:solidFill>
-              <a:schemeClr val="tx1"/>
-            </a:solidFill>
-          </a:ln>
-        </p:spPr>
-        <p:style>
-          <a:lnRef idx="2">
-            <a:schemeClr val="accent1">
-              <a:shade val="50000"/>
-            </a:schemeClr>
-          </a:lnRef>
-          <a:fillRef idx="1">
-            <a:schemeClr val="accent1"/>
-          </a:fillRef>
-          <a:effectRef idx="0">
-            <a:schemeClr val="accent1"/>
-          </a:effectRef>
-          <a:fontRef idx="minor">
-            <a:schemeClr val="lt1"/>
-          </a:fontRef>
-        </p:style>
-        <p:txBody>
-          <a:bodyPr rtlCol="0" anchor="ctr"/>
-          <a:lstStyle/>
-          <a:p>
-            <a:pPr algn="ctr"/>
-            <a:endParaRPr lang="es-ES"/>
-          </a:p>
-        </p:txBody>
-      </p:sp>
-      <p:sp>
-        <p:nvSpPr>
-          <p:cNvPr id="30" name="Estrella: 5 puntas 29">
-            <a:extLst>
-              <a:ext uri="{FF2B5EF4-FFF2-40B4-BE49-F238E27FC236}">
-                <a16:creationId xmlns:a16="http://schemas.microsoft.com/office/drawing/2014/main" id="{BDFE3A59-C124-4EBD-8267-610817834A23}"/>
-              </a:ext>
-            </a:extLst>
-          </p:cNvPr>
-          <p:cNvSpPr/>
-          <p:nvPr/>
-        </p:nvSpPr>
-        <p:spPr>
-          <a:xfrm>
-            <a:off x="9037604" y="3743530"/>
-            <a:ext cx="453006" cy="476197"/>
-          </a:xfrm>
-          <a:prstGeom prst="star5">
-            <a:avLst/>
-          </a:prstGeom>
-          <a:solidFill>
-            <a:srgbClr val="FFFF00"/>
-          </a:solidFill>
-          <a:ln>
-            <a:solidFill>
-              <a:schemeClr val="tx1"/>
-            </a:solidFill>
-          </a:ln>
-        </p:spPr>
-        <p:style>
-          <a:lnRef idx="2">
-            <a:schemeClr val="accent1">
-              <a:shade val="50000"/>
-            </a:schemeClr>
-          </a:lnRef>
-          <a:fillRef idx="1">
-            <a:schemeClr val="accent1"/>
-          </a:fillRef>
-          <a:effectRef idx="0">
-            <a:schemeClr val="accent1"/>
-          </a:effectRef>
-          <a:fontRef idx="minor">
-            <a:schemeClr val="lt1"/>
-          </a:fontRef>
-        </p:style>
-        <p:txBody>
-          <a:bodyPr rtlCol="0" anchor="ctr"/>
-          <a:lstStyle/>
-          <a:p>
-            <a:pPr algn="ctr"/>
-            <a:endParaRPr lang="es-ES"/>
           </a:p>
         </p:txBody>
       </p:sp>
@@ -21728,7 +21185,7 @@
         </p:nvSpPr>
         <p:spPr>
           <a:xfrm>
-            <a:off x="10897579" y="2536396"/>
+            <a:off x="10897579" y="3414700"/>
             <a:ext cx="813732" cy="759558"/>
           </a:xfrm>
           <a:prstGeom prst="triangle">
@@ -21777,7 +21234,7 @@
         </p:nvSpPr>
         <p:spPr>
           <a:xfrm>
-            <a:off x="11150603" y="2650310"/>
+            <a:off x="11150603" y="3528614"/>
             <a:ext cx="314510" cy="707886"/>
           </a:xfrm>
           <a:prstGeom prst="rect">
@@ -21834,7 +21291,7 @@
         </p:nvSpPr>
         <p:spPr>
           <a:xfrm>
-            <a:off x="10897579" y="4773450"/>
+            <a:off x="10897579" y="5651754"/>
             <a:ext cx="813732" cy="759558"/>
           </a:xfrm>
           <a:prstGeom prst="triangle">
@@ -21883,7 +21340,7 @@
         </p:nvSpPr>
         <p:spPr>
           <a:xfrm>
-            <a:off x="11150603" y="4887364"/>
+            <a:off x="11150603" y="5765668"/>
             <a:ext cx="314510" cy="707886"/>
           </a:xfrm>
           <a:prstGeom prst="rect">
@@ -21911,6 +21368,143 @@
               <a:t>!</a:t>
             </a:r>
             <a:endParaRPr lang="en-US" sz="4000" b="1" cap="none" spc="0" dirty="0">
+              <a:ln w="0"/>
+              <a:solidFill>
+                <a:schemeClr val="tx1"/>
+              </a:solidFill>
+              <a:effectLst>
+                <a:outerShdw blurRad="38100" dist="19050" dir="2700000" algn="tl" rotWithShape="0">
+                  <a:schemeClr val="dk1">
+                    <a:alpha val="40000"/>
+                  </a:schemeClr>
+                </a:outerShdw>
+              </a:effectLst>
+            </a:endParaRPr>
+          </a:p>
+        </p:txBody>
+      </p:sp>
+      <p:sp>
+        <p:nvSpPr>
+          <p:cNvPr id="2" name="Rectangle: Rounded Corners 1">
+            <a:extLst>
+              <a:ext uri="{FF2B5EF4-FFF2-40B4-BE49-F238E27FC236}">
+                <a16:creationId xmlns:a16="http://schemas.microsoft.com/office/drawing/2014/main" id="{AD688467-04BE-4DCA-98EF-C699E60F5ACB}"/>
+              </a:ext>
+            </a:extLst>
+          </p:cNvPr>
+          <p:cNvSpPr/>
+          <p:nvPr/>
+        </p:nvSpPr>
+        <p:spPr>
+          <a:xfrm>
+            <a:off x="8518358" y="1491915"/>
+            <a:ext cx="3324453" cy="603523"/>
+          </a:xfrm>
+          <a:prstGeom prst="roundRect">
+            <a:avLst/>
+          </a:prstGeom>
+          <a:noFill/>
+          <a:ln w="28575">
+            <a:solidFill>
+              <a:schemeClr val="tx1"/>
+            </a:solidFill>
+          </a:ln>
+        </p:spPr>
+        <p:style>
+          <a:lnRef idx="2">
+            <a:schemeClr val="accent6"/>
+          </a:lnRef>
+          <a:fillRef idx="1">
+            <a:schemeClr val="lt1"/>
+          </a:fillRef>
+          <a:effectRef idx="0">
+            <a:schemeClr val="accent6"/>
+          </a:effectRef>
+          <a:fontRef idx="minor">
+            <a:schemeClr val="dk1"/>
+          </a:fontRef>
+        </p:style>
+        <p:txBody>
+          <a:bodyPr rtlCol="0" anchor="ctr"/>
+          <a:lstStyle/>
+          <a:p>
+            <a:pPr algn="ctr"/>
+            <a:endParaRPr lang="en-US"/>
+          </a:p>
+        </p:txBody>
+      </p:sp>
+      <p:sp>
+        <p:nvSpPr>
+          <p:cNvPr id="32" name="Rectangle 31">
+            <a:extLst>
+              <a:ext uri="{FF2B5EF4-FFF2-40B4-BE49-F238E27FC236}">
+                <a16:creationId xmlns:a16="http://schemas.microsoft.com/office/drawing/2014/main" id="{16D05F49-4973-4C17-87B9-F423095E1C5B}"/>
+              </a:ext>
+            </a:extLst>
+          </p:cNvPr>
+          <p:cNvSpPr/>
+          <p:nvPr/>
+        </p:nvSpPr>
+        <p:spPr>
+          <a:xfrm>
+            <a:off x="8625980" y="1588846"/>
+            <a:ext cx="3108543" cy="400110"/>
+          </a:xfrm>
+          <a:prstGeom prst="rect">
+            <a:avLst/>
+          </a:prstGeom>
+          <a:noFill/>
+        </p:spPr>
+        <p:txBody>
+          <a:bodyPr wrap="none" lIns="91440" tIns="45720" rIns="91440" bIns="45720">
+            <a:spAutoFit/>
+          </a:bodyPr>
+          <a:lstStyle/>
+          <a:p>
+            <a:pPr algn="ctr"/>
+            <a:r>
+              <a:rPr lang="es-VE" sz="2000" b="0" cap="none" spc="0" dirty="0">
+                <a:ln w="0"/>
+                <a:solidFill>
+                  <a:schemeClr val="tx1"/>
+                </a:solidFill>
+                <a:effectLst>
+                  <a:outerShdw blurRad="38100" dist="19050" dir="2700000" algn="tl" rotWithShape="0">
+                    <a:schemeClr val="dk1">
+                      <a:alpha val="40000"/>
+                    </a:schemeClr>
+                  </a:outerShdw>
+                </a:effectLst>
+              </a:rPr>
+              <a:t>Convertirse en </a:t>
+            </a:r>
+            <a:r>
+              <a:rPr lang="es-VE" sz="2000" dirty="0">
+                <a:ln w="0"/>
+                <a:effectLst>
+                  <a:outerShdw blurRad="38100" dist="19050" dir="2700000" algn="tl" rotWithShape="0">
+                    <a:schemeClr val="dk1">
+                      <a:alpha val="40000"/>
+                    </a:schemeClr>
+                  </a:outerShdw>
+                </a:effectLst>
+              </a:rPr>
+              <a:t>Cat-</a:t>
+            </a:r>
+            <a:r>
+              <a:rPr lang="es-VE" sz="2000" dirty="0" err="1">
+                <a:ln w="0"/>
+                <a:effectLst>
+                  <a:outerShdw blurRad="38100" dist="19050" dir="2700000" algn="tl" rotWithShape="0">
+                    <a:schemeClr val="dk1">
+                      <a:alpha val="40000"/>
+                    </a:schemeClr>
+                  </a:outerShdw>
+                </a:effectLst>
+              </a:rPr>
+              <a:t>Sitter</a:t>
+            </a:r>
+            <a:endParaRPr lang="en-US" sz="2000" b="0" cap="none" spc="0" dirty="0">
               <a:ln w="0"/>
               <a:solidFill>
                 <a:schemeClr val="tx1"/>
@@ -22335,333 +21929,6 @@
       </p:sp>
       <p:sp>
         <p:nvSpPr>
-          <p:cNvPr id="14" name="Rectangle 10">
-            <a:extLst>
-              <a:ext uri="{FF2B5EF4-FFF2-40B4-BE49-F238E27FC236}">
-                <a16:creationId xmlns:a16="http://schemas.microsoft.com/office/drawing/2014/main" id="{1FF85E92-B7AD-4BCA-AA7E-28CE58E69FBD}"/>
-              </a:ext>
-            </a:extLst>
-          </p:cNvPr>
-          <p:cNvSpPr/>
-          <p:nvPr/>
-        </p:nvSpPr>
-        <p:spPr>
-          <a:xfrm>
-            <a:off x="7520897" y="1509204"/>
-            <a:ext cx="1420582" cy="400110"/>
-          </a:xfrm>
-          <a:prstGeom prst="rect">
-            <a:avLst/>
-          </a:prstGeom>
-          <a:noFill/>
-        </p:spPr>
-        <p:txBody>
-          <a:bodyPr wrap="none" lIns="91440" tIns="45720" rIns="91440" bIns="45720">
-            <a:spAutoFit/>
-          </a:bodyPr>
-          <a:lstStyle/>
-          <a:p>
-            <a:r>
-              <a:rPr lang="en-US" sz="2000" dirty="0" err="1">
-                <a:ln w="0"/>
-                <a:effectLst>
-                  <a:outerShdw blurRad="38100" dist="19050" dir="2700000" algn="tl" rotWithShape="0">
-                    <a:schemeClr val="dk1">
-                      <a:alpha val="40000"/>
-                    </a:schemeClr>
-                  </a:outerShdw>
-                </a:effectLst>
-              </a:rPr>
-              <a:t>Valoración</a:t>
-            </a:r>
-            <a:endParaRPr lang="en-US" sz="2000" b="0" cap="none" spc="0" dirty="0">
-              <a:ln w="0"/>
-              <a:solidFill>
-                <a:schemeClr val="tx1"/>
-              </a:solidFill>
-              <a:effectLst>
-                <a:outerShdw blurRad="38100" dist="19050" dir="2700000" algn="tl" rotWithShape="0">
-                  <a:schemeClr val="dk1">
-                    <a:alpha val="40000"/>
-                  </a:schemeClr>
-                </a:outerShdw>
-              </a:effectLst>
-            </a:endParaRPr>
-          </a:p>
-        </p:txBody>
-      </p:sp>
-      <p:sp>
-        <p:nvSpPr>
-          <p:cNvPr id="3" name="Estrella: 5 puntas 2">
-            <a:extLst>
-              <a:ext uri="{FF2B5EF4-FFF2-40B4-BE49-F238E27FC236}">
-                <a16:creationId xmlns:a16="http://schemas.microsoft.com/office/drawing/2014/main" id="{CA59AEE3-16BB-4B60-8F79-CB800962C72B}"/>
-              </a:ext>
-            </a:extLst>
-          </p:cNvPr>
-          <p:cNvSpPr/>
-          <p:nvPr/>
-        </p:nvSpPr>
-        <p:spPr>
-          <a:xfrm>
-            <a:off x="9605363" y="1433117"/>
-            <a:ext cx="453006" cy="476197"/>
-          </a:xfrm>
-          <a:prstGeom prst="star5">
-            <a:avLst/>
-          </a:prstGeom>
-          <a:solidFill>
-            <a:srgbClr val="FFFF00"/>
-          </a:solidFill>
-          <a:ln>
-            <a:solidFill>
-              <a:schemeClr val="tx1"/>
-            </a:solidFill>
-          </a:ln>
-        </p:spPr>
-        <p:style>
-          <a:lnRef idx="2">
-            <a:schemeClr val="accent1">
-              <a:shade val="50000"/>
-            </a:schemeClr>
-          </a:lnRef>
-          <a:fillRef idx="1">
-            <a:schemeClr val="accent1"/>
-          </a:fillRef>
-          <a:effectRef idx="0">
-            <a:schemeClr val="accent1"/>
-          </a:effectRef>
-          <a:fontRef idx="minor">
-            <a:schemeClr val="lt1"/>
-          </a:fontRef>
-        </p:style>
-        <p:txBody>
-          <a:bodyPr rtlCol="0" anchor="ctr"/>
-          <a:lstStyle/>
-          <a:p>
-            <a:pPr algn="ctr"/>
-            <a:endParaRPr lang="es-ES"/>
-          </a:p>
-        </p:txBody>
-      </p:sp>
-      <p:sp>
-        <p:nvSpPr>
-          <p:cNvPr id="15" name="Estrella: 5 puntas 14">
-            <a:extLst>
-              <a:ext uri="{FF2B5EF4-FFF2-40B4-BE49-F238E27FC236}">
-                <a16:creationId xmlns:a16="http://schemas.microsoft.com/office/drawing/2014/main" id="{FFDE9C7A-6F17-418D-8EB6-F3F063ED29C9}"/>
-              </a:ext>
-            </a:extLst>
-          </p:cNvPr>
-          <p:cNvSpPr/>
-          <p:nvPr/>
-        </p:nvSpPr>
-        <p:spPr>
-          <a:xfrm>
-            <a:off x="11297147" y="1433118"/>
-            <a:ext cx="453006" cy="476197"/>
-          </a:xfrm>
-          <a:prstGeom prst="star5">
-            <a:avLst/>
-          </a:prstGeom>
-          <a:solidFill>
-            <a:srgbClr val="FFFF00"/>
-          </a:solidFill>
-          <a:ln>
-            <a:solidFill>
-              <a:schemeClr val="tx1"/>
-            </a:solidFill>
-          </a:ln>
-        </p:spPr>
-        <p:style>
-          <a:lnRef idx="2">
-            <a:schemeClr val="accent1">
-              <a:shade val="50000"/>
-            </a:schemeClr>
-          </a:lnRef>
-          <a:fillRef idx="1">
-            <a:schemeClr val="accent1"/>
-          </a:fillRef>
-          <a:effectRef idx="0">
-            <a:schemeClr val="accent1"/>
-          </a:effectRef>
-          <a:fontRef idx="minor">
-            <a:schemeClr val="lt1"/>
-          </a:fontRef>
-        </p:style>
-        <p:txBody>
-          <a:bodyPr rtlCol="0" anchor="ctr"/>
-          <a:lstStyle/>
-          <a:p>
-            <a:pPr algn="ctr"/>
-            <a:endParaRPr lang="es-ES"/>
-          </a:p>
-        </p:txBody>
-      </p:sp>
-      <p:sp>
-        <p:nvSpPr>
-          <p:cNvPr id="16" name="Estrella: 5 puntas 15">
-            <a:extLst>
-              <a:ext uri="{FF2B5EF4-FFF2-40B4-BE49-F238E27FC236}">
-                <a16:creationId xmlns:a16="http://schemas.microsoft.com/office/drawing/2014/main" id="{1D451DFB-2F05-4E9B-82C5-3913E1784433}"/>
-              </a:ext>
-            </a:extLst>
-          </p:cNvPr>
-          <p:cNvSpPr/>
-          <p:nvPr/>
-        </p:nvSpPr>
-        <p:spPr>
-          <a:xfrm>
-            <a:off x="10722814" y="1433118"/>
-            <a:ext cx="453006" cy="476197"/>
-          </a:xfrm>
-          <a:prstGeom prst="star5">
-            <a:avLst/>
-          </a:prstGeom>
-          <a:solidFill>
-            <a:srgbClr val="FFFF00"/>
-          </a:solidFill>
-          <a:ln>
-            <a:solidFill>
-              <a:schemeClr val="tx1"/>
-            </a:solidFill>
-          </a:ln>
-        </p:spPr>
-        <p:style>
-          <a:lnRef idx="2">
-            <a:schemeClr val="accent1">
-              <a:shade val="50000"/>
-            </a:schemeClr>
-          </a:lnRef>
-          <a:fillRef idx="1">
-            <a:schemeClr val="accent1"/>
-          </a:fillRef>
-          <a:effectRef idx="0">
-            <a:schemeClr val="accent1"/>
-          </a:effectRef>
-          <a:fontRef idx="minor">
-            <a:schemeClr val="lt1"/>
-          </a:fontRef>
-        </p:style>
-        <p:txBody>
-          <a:bodyPr rtlCol="0" anchor="ctr"/>
-          <a:lstStyle/>
-          <a:p>
-            <a:pPr algn="ctr"/>
-            <a:endParaRPr lang="es-ES"/>
-          </a:p>
-        </p:txBody>
-      </p:sp>
-      <p:sp>
-        <p:nvSpPr>
-          <p:cNvPr id="17" name="Estrella: 5 puntas 16">
-            <a:extLst>
-              <a:ext uri="{FF2B5EF4-FFF2-40B4-BE49-F238E27FC236}">
-                <a16:creationId xmlns:a16="http://schemas.microsoft.com/office/drawing/2014/main" id="{D1B869E9-1071-4FDF-A6E3-DDB16F865513}"/>
-              </a:ext>
-            </a:extLst>
-          </p:cNvPr>
-          <p:cNvSpPr/>
-          <p:nvPr/>
-        </p:nvSpPr>
-        <p:spPr>
-          <a:xfrm>
-            <a:off x="10180257" y="1433117"/>
-            <a:ext cx="453006" cy="476197"/>
-          </a:xfrm>
-          <a:prstGeom prst="star5">
-            <a:avLst/>
-          </a:prstGeom>
-          <a:solidFill>
-            <a:srgbClr val="FFFF00"/>
-          </a:solidFill>
-          <a:ln>
-            <a:solidFill>
-              <a:schemeClr val="tx1"/>
-            </a:solidFill>
-          </a:ln>
-        </p:spPr>
-        <p:style>
-          <a:lnRef idx="2">
-            <a:schemeClr val="accent1">
-              <a:shade val="50000"/>
-            </a:schemeClr>
-          </a:lnRef>
-          <a:fillRef idx="1">
-            <a:schemeClr val="accent1"/>
-          </a:fillRef>
-          <a:effectRef idx="0">
-            <a:schemeClr val="accent1"/>
-          </a:effectRef>
-          <a:fontRef idx="minor">
-            <a:schemeClr val="lt1"/>
-          </a:fontRef>
-        </p:style>
-        <p:txBody>
-          <a:bodyPr rtlCol="0" anchor="ctr"/>
-          <a:lstStyle/>
-          <a:p>
-            <a:pPr algn="ctr"/>
-            <a:endParaRPr lang="es-ES"/>
-          </a:p>
-        </p:txBody>
-      </p:sp>
-      <p:sp>
-        <p:nvSpPr>
-          <p:cNvPr id="18" name="Estrella: 5 puntas 17">
-            <a:extLst>
-              <a:ext uri="{FF2B5EF4-FFF2-40B4-BE49-F238E27FC236}">
-                <a16:creationId xmlns:a16="http://schemas.microsoft.com/office/drawing/2014/main" id="{D45AA46C-8801-4CBF-8203-4CD04F51D6B6}"/>
-              </a:ext>
-            </a:extLst>
-          </p:cNvPr>
-          <p:cNvSpPr/>
-          <p:nvPr/>
-        </p:nvSpPr>
-        <p:spPr>
-          <a:xfrm>
-            <a:off x="9030306" y="1433116"/>
-            <a:ext cx="453006" cy="476197"/>
-          </a:xfrm>
-          <a:prstGeom prst="star5">
-            <a:avLst/>
-          </a:prstGeom>
-          <a:solidFill>
-            <a:srgbClr val="FFFF00"/>
-          </a:solidFill>
-          <a:ln>
-            <a:solidFill>
-              <a:schemeClr val="tx1"/>
-            </a:solidFill>
-          </a:ln>
-        </p:spPr>
-        <p:style>
-          <a:lnRef idx="2">
-            <a:schemeClr val="accent1">
-              <a:shade val="50000"/>
-            </a:schemeClr>
-          </a:lnRef>
-          <a:fillRef idx="1">
-            <a:schemeClr val="accent1"/>
-          </a:fillRef>
-          <a:effectRef idx="0">
-            <a:schemeClr val="accent1"/>
-          </a:effectRef>
-          <a:fontRef idx="minor">
-            <a:schemeClr val="lt1"/>
-          </a:fontRef>
-        </p:style>
-        <p:txBody>
-          <a:bodyPr rtlCol="0" anchor="ctr"/>
-          <a:lstStyle/>
-          <a:p>
-            <a:pPr algn="ctr"/>
-            <a:endParaRPr lang="es-ES"/>
-          </a:p>
-        </p:txBody>
-      </p:sp>
-      <p:sp>
-        <p:nvSpPr>
           <p:cNvPr id="22" name="Rectangle 7">
             <a:extLst>
               <a:ext uri="{FF2B5EF4-FFF2-40B4-BE49-F238E27FC236}">
@@ -22798,78 +22065,6 @@
                 </a:solidFill>
               </a:rPr>
               <a:t>Modificar perfil</a:t>
-            </a:r>
-            <a:endParaRPr lang="en-US" sz="2000" dirty="0">
-              <a:solidFill>
-                <a:schemeClr val="bg1"/>
-              </a:solidFill>
-            </a:endParaRPr>
-          </a:p>
-        </p:txBody>
-      </p:sp>
-      <p:sp>
-        <p:nvSpPr>
-          <p:cNvPr id="24" name="Rectangle: Rounded Corners 7">
-            <a:extLst>
-              <a:ext uri="{FF2B5EF4-FFF2-40B4-BE49-F238E27FC236}">
-                <a16:creationId xmlns:a16="http://schemas.microsoft.com/office/drawing/2014/main" id="{9B849E7A-0E43-4B9B-B113-4ECFD389CC82}"/>
-              </a:ext>
-            </a:extLst>
-          </p:cNvPr>
-          <p:cNvSpPr/>
-          <p:nvPr/>
-        </p:nvSpPr>
-        <p:spPr>
-          <a:xfrm>
-            <a:off x="441847" y="5620148"/>
-            <a:ext cx="2782036" cy="717205"/>
-          </a:xfrm>
-          <a:prstGeom prst="roundRect">
-            <a:avLst/>
-          </a:prstGeom>
-          <a:solidFill>
-            <a:srgbClr val="0070C0"/>
-          </a:solidFill>
-          <a:ln>
-            <a:noFill/>
-          </a:ln>
-        </p:spPr>
-        <p:style>
-          <a:lnRef idx="2">
-            <a:schemeClr val="accent1">
-              <a:shade val="50000"/>
-            </a:schemeClr>
-          </a:lnRef>
-          <a:fillRef idx="1">
-            <a:schemeClr val="accent1"/>
-          </a:fillRef>
-          <a:effectRef idx="0">
-            <a:schemeClr val="accent1"/>
-          </a:effectRef>
-          <a:fontRef idx="minor">
-            <a:schemeClr val="lt1"/>
-          </a:fontRef>
-        </p:style>
-        <p:txBody>
-          <a:bodyPr rtlCol="0" anchor="ctr"/>
-          <a:lstStyle/>
-          <a:p>
-            <a:pPr algn="ctr"/>
-            <a:r>
-              <a:rPr lang="es-VE" sz="2000" dirty="0">
-                <a:solidFill>
-                  <a:schemeClr val="bg1"/>
-                </a:solidFill>
-              </a:rPr>
-              <a:t>Solicitud para </a:t>
-            </a:r>
-            <a:r>
-              <a:rPr lang="es-VE" sz="2000" dirty="0" err="1">
-                <a:solidFill>
-                  <a:schemeClr val="bg1"/>
-                </a:solidFill>
-              </a:rPr>
-              <a:t>catsitter</a:t>
             </a:r>
             <a:endParaRPr lang="en-US" sz="2000" dirty="0">
               <a:solidFill>

</xml_diff>